<commit_message>
v 1.29, choose cells by chosen zones, initial head function of z had end instruction, units fix, post-build copy mut.exe to mut_examples repos, manual
</commit_message>
<xml_diff>
--- a/Docs/User's Guide/Imagery/Installation Images.pptx
+++ b/Docs/User's Guide/Imagery/Installation Images.pptx
@@ -5,15 +5,21 @@
     <p:sldMasterId id="2147483648" r:id="rId1"/>
   </p:sldMasterIdLst>
   <p:sldIdLst>
-    <p:sldId id="256" r:id="rId2"/>
-    <p:sldId id="258" r:id="rId3"/>
-    <p:sldId id="257" r:id="rId4"/>
-    <p:sldId id="259" r:id="rId5"/>
-    <p:sldId id="260" r:id="rId6"/>
-    <p:sldId id="264" r:id="rId7"/>
-    <p:sldId id="261" r:id="rId8"/>
-    <p:sldId id="262" r:id="rId9"/>
-    <p:sldId id="263" r:id="rId10"/>
+    <p:sldId id="265" r:id="rId2"/>
+    <p:sldId id="256" r:id="rId3"/>
+    <p:sldId id="266" r:id="rId4"/>
+    <p:sldId id="258" r:id="rId5"/>
+    <p:sldId id="257" r:id="rId6"/>
+    <p:sldId id="267" r:id="rId7"/>
+    <p:sldId id="268" r:id="rId8"/>
+    <p:sldId id="269" r:id="rId9"/>
+    <p:sldId id="270" r:id="rId10"/>
+    <p:sldId id="259" r:id="rId11"/>
+    <p:sldId id="260" r:id="rId12"/>
+    <p:sldId id="264" r:id="rId13"/>
+    <p:sldId id="261" r:id="rId14"/>
+    <p:sldId id="262" r:id="rId15"/>
+    <p:sldId id="263" r:id="rId16"/>
   </p:sldIdLst>
   <p:sldSz cx="12192000" cy="6858000"/>
   <p:notesSz cx="6858000" cy="9144000"/>
@@ -269,7 +275,7 @@
           <a:p>
             <a:fld id="{4D45891E-2CD5-4CE6-8274-44086644E53A}" type="datetimeFigureOut">
               <a:rPr lang="en-CA" smtClean="0"/>
-              <a:t>2024-08-26</a:t>
+              <a:t>2024-09-26</a:t>
             </a:fld>
             <a:endParaRPr lang="en-CA"/>
           </a:p>
@@ -469,7 +475,7 @@
           <a:p>
             <a:fld id="{4D45891E-2CD5-4CE6-8274-44086644E53A}" type="datetimeFigureOut">
               <a:rPr lang="en-CA" smtClean="0"/>
-              <a:t>2024-08-26</a:t>
+              <a:t>2024-09-26</a:t>
             </a:fld>
             <a:endParaRPr lang="en-CA"/>
           </a:p>
@@ -679,7 +685,7 @@
           <a:p>
             <a:fld id="{4D45891E-2CD5-4CE6-8274-44086644E53A}" type="datetimeFigureOut">
               <a:rPr lang="en-CA" smtClean="0"/>
-              <a:t>2024-08-26</a:t>
+              <a:t>2024-09-26</a:t>
             </a:fld>
             <a:endParaRPr lang="en-CA"/>
           </a:p>
@@ -879,7 +885,7 @@
           <a:p>
             <a:fld id="{4D45891E-2CD5-4CE6-8274-44086644E53A}" type="datetimeFigureOut">
               <a:rPr lang="en-CA" smtClean="0"/>
-              <a:t>2024-08-26</a:t>
+              <a:t>2024-09-26</a:t>
             </a:fld>
             <a:endParaRPr lang="en-CA"/>
           </a:p>
@@ -1155,7 +1161,7 @@
           <a:p>
             <a:fld id="{4D45891E-2CD5-4CE6-8274-44086644E53A}" type="datetimeFigureOut">
               <a:rPr lang="en-CA" smtClean="0"/>
-              <a:t>2024-08-26</a:t>
+              <a:t>2024-09-26</a:t>
             </a:fld>
             <a:endParaRPr lang="en-CA"/>
           </a:p>
@@ -1423,7 +1429,7 @@
           <a:p>
             <a:fld id="{4D45891E-2CD5-4CE6-8274-44086644E53A}" type="datetimeFigureOut">
               <a:rPr lang="en-CA" smtClean="0"/>
-              <a:t>2024-08-26</a:t>
+              <a:t>2024-09-26</a:t>
             </a:fld>
             <a:endParaRPr lang="en-CA"/>
           </a:p>
@@ -1838,7 +1844,7 @@
           <a:p>
             <a:fld id="{4D45891E-2CD5-4CE6-8274-44086644E53A}" type="datetimeFigureOut">
               <a:rPr lang="en-CA" smtClean="0"/>
-              <a:t>2024-08-26</a:t>
+              <a:t>2024-09-26</a:t>
             </a:fld>
             <a:endParaRPr lang="en-CA"/>
           </a:p>
@@ -1980,7 +1986,7 @@
           <a:p>
             <a:fld id="{4D45891E-2CD5-4CE6-8274-44086644E53A}" type="datetimeFigureOut">
               <a:rPr lang="en-CA" smtClean="0"/>
-              <a:t>2024-08-26</a:t>
+              <a:t>2024-09-26</a:t>
             </a:fld>
             <a:endParaRPr lang="en-CA"/>
           </a:p>
@@ -2093,7 +2099,7 @@
           <a:p>
             <a:fld id="{4D45891E-2CD5-4CE6-8274-44086644E53A}" type="datetimeFigureOut">
               <a:rPr lang="en-CA" smtClean="0"/>
-              <a:t>2024-08-26</a:t>
+              <a:t>2024-09-26</a:t>
             </a:fld>
             <a:endParaRPr lang="en-CA"/>
           </a:p>
@@ -2406,7 +2412,7 @@
           <a:p>
             <a:fld id="{4D45891E-2CD5-4CE6-8274-44086644E53A}" type="datetimeFigureOut">
               <a:rPr lang="en-CA" smtClean="0"/>
-              <a:t>2024-08-26</a:t>
+              <a:t>2024-09-26</a:t>
             </a:fld>
             <a:endParaRPr lang="en-CA"/>
           </a:p>
@@ -2695,7 +2701,7 @@
           <a:p>
             <a:fld id="{4D45891E-2CD5-4CE6-8274-44086644E53A}" type="datetimeFigureOut">
               <a:rPr lang="en-CA" smtClean="0"/>
-              <a:t>2024-08-26</a:t>
+              <a:t>2024-09-26</a:t>
             </a:fld>
             <a:endParaRPr lang="en-CA"/>
           </a:p>
@@ -2938,7 +2944,7 @@
           <a:p>
             <a:fld id="{4D45891E-2CD5-4CE6-8274-44086644E53A}" type="datetimeFigureOut">
               <a:rPr lang="en-CA" smtClean="0"/>
-              <a:t>2024-08-26</a:t>
+              <a:t>2024-09-26</a:t>
             </a:fld>
             <a:endParaRPr lang="en-CA"/>
           </a:p>
@@ -3371,14 +3377,13 @@
         </p:nvPicPr>
         <p:blipFill>
           <a:blip r:embed="rId2"/>
-          <a:stretch>
-            <a:fillRect/>
-          </a:stretch>
+          <a:srcRect b="64945"/>
+          <a:stretch/>
         </p:blipFill>
         <p:spPr>
           <a:xfrm>
-            <a:off x="242070" y="1309391"/>
-            <a:ext cx="11707859" cy="4239217"/>
+            <a:off x="242070" y="1309392"/>
+            <a:ext cx="11707859" cy="1486060"/>
           </a:xfrm>
           <a:prstGeom prst="rect">
             <a:avLst/>
@@ -3489,12 +3494,42 @@
           </a:p>
         </p:txBody>
       </p:sp>
-      <p:sp>
-        <p:nvSpPr>
-          <p:cNvPr id="8" name="Oval 7">
-            <a:extLst>
-              <a:ext uri="{FF2B5EF4-FFF2-40B4-BE49-F238E27FC236}">
-                <a16:creationId xmlns:a16="http://schemas.microsoft.com/office/drawing/2014/main" id="{72C62E71-D361-BC15-E3EF-A834F301FACB}"/>
+    </p:spTree>
+    <p:extLst>
+      <p:ext uri="{BB962C8B-B14F-4D97-AF65-F5344CB8AC3E}">
+        <p14:creationId xmlns:p14="http://schemas.microsoft.com/office/powerpoint/2010/main" val="1931239768"/>
+      </p:ext>
+    </p:extLst>
+  </p:cSld>
+  <p:clrMapOvr>
+    <a:masterClrMapping/>
+  </p:clrMapOvr>
+</p:sld>
+</file>
+
+<file path=ppt/slides/slide10.xml><?xml version="1.0" encoding="utf-8"?>
+<p:sld xmlns:a="http://schemas.openxmlformats.org/drawingml/2006/main" xmlns:r="http://schemas.openxmlformats.org/officeDocument/2006/relationships" xmlns:p="http://schemas.openxmlformats.org/presentationml/2006/main">
+  <p:cSld>
+    <p:spTree>
+      <p:nvGrpSpPr>
+        <p:cNvPr id="1" name=""/>
+        <p:cNvGrpSpPr/>
+        <p:nvPr/>
+      </p:nvGrpSpPr>
+      <p:grpSpPr>
+        <a:xfrm>
+          <a:off x="0" y="0"/>
+          <a:ext cx="0" cy="0"/>
+          <a:chOff x="0" y="0"/>
+          <a:chExt cx="0" cy="0"/>
+        </a:xfrm>
+      </p:grpSpPr>
+      <p:sp>
+        <p:nvSpPr>
+          <p:cNvPr id="4" name="Rectangle 3">
+            <a:extLst>
+              <a:ext uri="{FF2B5EF4-FFF2-40B4-BE49-F238E27FC236}">
+                <a16:creationId xmlns:a16="http://schemas.microsoft.com/office/drawing/2014/main" id="{9E6FDE31-8760-8702-42A7-7A0EABD25BB4}"/>
               </a:ext>
             </a:extLst>
           </p:cNvPr>
@@ -3503,17 +3538,17 @@
         </p:nvSpPr>
         <p:spPr>
           <a:xfrm>
-            <a:off x="7924801" y="4895465"/>
-            <a:ext cx="1600200" cy="653143"/>
-          </a:xfrm>
-          <a:prstGeom prst="ellipse">
+            <a:off x="800100" y="504825"/>
+            <a:ext cx="4200525" cy="1771651"/>
+          </a:xfrm>
+          <a:prstGeom prst="rect">
             <a:avLst/>
           </a:prstGeom>
-          <a:noFill/>
-          <a:ln w="47625">
-            <a:solidFill>
-              <a:schemeClr val="accent2"/>
-            </a:solidFill>
+          <a:solidFill>
+            <a:schemeClr val="bg1"/>
+          </a:solidFill>
+          <a:ln>
+            <a:noFill/>
           </a:ln>
         </p:spPr>
         <p:style>
@@ -3541,10 +3576,40 @@
           </a:p>
         </p:txBody>
       </p:sp>
+      <p:pic>
+        <p:nvPicPr>
+          <p:cNvPr id="3" name="Picture 2">
+            <a:extLst>
+              <a:ext uri="{FF2B5EF4-FFF2-40B4-BE49-F238E27FC236}">
+                <a16:creationId xmlns:a16="http://schemas.microsoft.com/office/drawing/2014/main" id="{9282D1F6-C550-3ED1-B87B-7795ADD770BF}"/>
+              </a:ext>
+            </a:extLst>
+          </p:cNvPr>
+          <p:cNvPicPr>
+            <a:picLocks noChangeAspect="1"/>
+          </p:cNvPicPr>
+          <p:nvPr/>
+        </p:nvPicPr>
+        <p:blipFill>
+          <a:blip r:embed="rId2"/>
+          <a:stretch>
+            <a:fillRect/>
+          </a:stretch>
+        </p:blipFill>
+        <p:spPr>
+          <a:xfrm>
+            <a:off x="904596" y="852413"/>
+            <a:ext cx="4001058" cy="1057423"/>
+          </a:xfrm>
+          <a:prstGeom prst="rect">
+            <a:avLst/>
+          </a:prstGeom>
+        </p:spPr>
+      </p:pic>
     </p:spTree>
     <p:extLst>
       <p:ext uri="{BB962C8B-B14F-4D97-AF65-F5344CB8AC3E}">
-        <p14:creationId xmlns:p14="http://schemas.microsoft.com/office/powerpoint/2010/main" val="3387442404"/>
+        <p14:creationId xmlns:p14="http://schemas.microsoft.com/office/powerpoint/2010/main" val="1675951217"/>
       </p:ext>
     </p:extLst>
   </p:cSld>
@@ -3554,7 +3619,7 @@
 </p:sld>
 </file>
 
-<file path=ppt/slides/slide2.xml><?xml version="1.0" encoding="utf-8"?>
+<file path=ppt/slides/slide11.xml><?xml version="1.0" encoding="utf-8"?>
 <p:sld xmlns:a="http://schemas.openxmlformats.org/drawingml/2006/main" xmlns:r="http://schemas.openxmlformats.org/officeDocument/2006/relationships" xmlns:p="http://schemas.openxmlformats.org/presentationml/2006/main">
   <p:cSld>
     <p:spTree>
@@ -3571,12 +3636,64 @@
           <a:chExt cx="0" cy="0"/>
         </a:xfrm>
       </p:grpSpPr>
+      <p:sp>
+        <p:nvSpPr>
+          <p:cNvPr id="7" name="Rectangle 6">
+            <a:extLst>
+              <a:ext uri="{FF2B5EF4-FFF2-40B4-BE49-F238E27FC236}">
+                <a16:creationId xmlns:a16="http://schemas.microsoft.com/office/drawing/2014/main" id="{28DC8F54-824A-8518-D7E2-A78560480AE5}"/>
+              </a:ext>
+            </a:extLst>
+          </p:cNvPr>
+          <p:cNvSpPr/>
+          <p:nvPr/>
+        </p:nvSpPr>
+        <p:spPr>
+          <a:xfrm>
+            <a:off x="752476" y="600075"/>
+            <a:ext cx="6838950" cy="3438525"/>
+          </a:xfrm>
+          <a:prstGeom prst="rect">
+            <a:avLst/>
+          </a:prstGeom>
+          <a:solidFill>
+            <a:schemeClr val="bg1"/>
+          </a:solidFill>
+          <a:ln>
+            <a:noFill/>
+          </a:ln>
+        </p:spPr>
+        <p:style>
+          <a:lnRef idx="2">
+            <a:schemeClr val="accent1">
+              <a:shade val="15000"/>
+            </a:schemeClr>
+          </a:lnRef>
+          <a:fillRef idx="1">
+            <a:schemeClr val="accent1"/>
+          </a:fillRef>
+          <a:effectRef idx="0">
+            <a:schemeClr val="accent1"/>
+          </a:effectRef>
+          <a:fontRef idx="minor">
+            <a:schemeClr val="lt1"/>
+          </a:fontRef>
+        </p:style>
+        <p:txBody>
+          <a:bodyPr rtlCol="0" anchor="ctr"/>
+          <a:lstStyle/>
+          <a:p>
+            <a:pPr algn="ctr"/>
+            <a:endParaRPr lang="en-CA"/>
+          </a:p>
+        </p:txBody>
+      </p:sp>
       <p:pic>
         <p:nvPicPr>
           <p:cNvPr id="3" name="Picture 2">
             <a:extLst>
               <a:ext uri="{FF2B5EF4-FFF2-40B4-BE49-F238E27FC236}">
-                <a16:creationId xmlns:a16="http://schemas.microsoft.com/office/drawing/2014/main" id="{A68F7D2F-4A4D-7ECE-E208-054B6F7BBB7E}"/>
+                <a16:creationId xmlns:a16="http://schemas.microsoft.com/office/drawing/2014/main" id="{C2775D54-B9E1-3926-F98A-3366B1BD498A}"/>
               </a:ext>
             </a:extLst>
           </p:cNvPr>
@@ -3585,16 +3702,15 @@
           </p:cNvPicPr>
           <p:nvPr/>
         </p:nvPicPr>
-        <p:blipFill>
+        <p:blipFill rotWithShape="1">
           <a:blip r:embed="rId2"/>
-          <a:stretch>
-            <a:fillRect/>
-          </a:stretch>
+          <a:srcRect r="29910" b="57927"/>
+          <a:stretch/>
         </p:blipFill>
         <p:spPr>
           <a:xfrm>
-            <a:off x="637767" y="290375"/>
-            <a:ext cx="4887007" cy="1971950"/>
+            <a:off x="847051" y="971552"/>
+            <a:ext cx="6544349" cy="2615061"/>
           </a:xfrm>
           <a:prstGeom prst="rect">
             <a:avLst/>
@@ -3606,255 +3722,62 @@
           </a:ln>
         </p:spPr>
       </p:pic>
-      <p:pic>
-        <p:nvPicPr>
-          <p:cNvPr id="5" name="Picture 4">
-            <a:extLst>
-              <a:ext uri="{FF2B5EF4-FFF2-40B4-BE49-F238E27FC236}">
-                <a16:creationId xmlns:a16="http://schemas.microsoft.com/office/drawing/2014/main" id="{510F4739-C1AE-FC04-1031-2664A3A57B73}"/>
-              </a:ext>
-            </a:extLst>
-          </p:cNvPr>
-          <p:cNvPicPr>
-            <a:picLocks noChangeAspect="1"/>
-          </p:cNvPicPr>
+      <p:sp>
+        <p:nvSpPr>
+          <p:cNvPr id="4" name="Oval 3">
+            <a:extLst>
+              <a:ext uri="{FF2B5EF4-FFF2-40B4-BE49-F238E27FC236}">
+                <a16:creationId xmlns:a16="http://schemas.microsoft.com/office/drawing/2014/main" id="{F7149A0A-24C4-2191-7E81-FD333A4C9481}"/>
+              </a:ext>
+            </a:extLst>
+          </p:cNvPr>
+          <p:cNvSpPr/>
           <p:nvPr/>
-        </p:nvPicPr>
-        <p:blipFill>
-          <a:blip r:embed="rId3"/>
-          <a:stretch>
-            <a:fillRect/>
-          </a:stretch>
-        </p:blipFill>
-        <p:spPr>
-          <a:xfrm>
-            <a:off x="5886042" y="290375"/>
-            <a:ext cx="5849166" cy="4324954"/>
-          </a:xfrm>
-          <a:prstGeom prst="rect">
-            <a:avLst/>
-          </a:prstGeom>
-          <a:ln>
-            <a:solidFill>
-              <a:schemeClr val="tx1"/>
-            </a:solidFill>
-          </a:ln>
-        </p:spPr>
-      </p:pic>
-      <p:pic>
-        <p:nvPicPr>
-          <p:cNvPr id="7" name="Picture 6">
-            <a:extLst>
-              <a:ext uri="{FF2B5EF4-FFF2-40B4-BE49-F238E27FC236}">
-                <a16:creationId xmlns:a16="http://schemas.microsoft.com/office/drawing/2014/main" id="{E45E2FAA-385E-A3DB-BE49-3D21B846466E}"/>
-              </a:ext>
-            </a:extLst>
-          </p:cNvPr>
-          <p:cNvPicPr>
-            <a:picLocks noChangeAspect="1"/>
-          </p:cNvPicPr>
-          <p:nvPr/>
-        </p:nvPicPr>
-        <p:blipFill>
-          <a:blip r:embed="rId4"/>
-          <a:stretch>
-            <a:fillRect/>
-          </a:stretch>
-        </p:blipFill>
-        <p:spPr>
-          <a:xfrm>
-            <a:off x="637767" y="2566779"/>
-            <a:ext cx="4324954" cy="2981741"/>
-          </a:xfrm>
-          <a:prstGeom prst="rect">
-            <a:avLst/>
-          </a:prstGeom>
-          <a:ln>
-            <a:solidFill>
-              <a:schemeClr val="tx1"/>
-            </a:solidFill>
-          </a:ln>
-        </p:spPr>
-      </p:pic>
-      <p:sp>
-        <p:nvSpPr>
-          <p:cNvPr id="8" name="TextBox 7">
-            <a:extLst>
-              <a:ext uri="{FF2B5EF4-FFF2-40B4-BE49-F238E27FC236}">
-                <a16:creationId xmlns:a16="http://schemas.microsoft.com/office/drawing/2014/main" id="{283B6898-3EDD-01BD-0D5E-EE97D21A1115}"/>
-              </a:ext>
-            </a:extLst>
-          </p:cNvPr>
-          <p:cNvSpPr txBox="1"/>
-          <p:nvPr/>
-        </p:nvSpPr>
-        <p:spPr>
-          <a:xfrm>
-            <a:off x="393027" y="105709"/>
-            <a:ext cx="301686" cy="369332"/>
-          </a:xfrm>
-          <a:prstGeom prst="rect">
+        </p:nvSpPr>
+        <p:spPr>
+          <a:xfrm>
+            <a:off x="5419725" y="3310387"/>
+            <a:ext cx="676275" cy="276226"/>
+          </a:xfrm>
+          <a:prstGeom prst="ellipse">
             <a:avLst/>
           </a:prstGeom>
           <a:noFill/>
-        </p:spPr>
-        <p:txBody>
-          <a:bodyPr wrap="none" rtlCol="0">
-            <a:spAutoFit/>
-          </a:bodyPr>
-          <a:lstStyle/>
-          <a:p>
-            <a:r>
-              <a:rPr lang="en-CA"/>
-              <a:t>1</a:t>
-            </a:r>
-          </a:p>
-        </p:txBody>
-      </p:sp>
-      <p:sp>
-        <p:nvSpPr>
-          <p:cNvPr id="9" name="TextBox 8">
-            <a:extLst>
-              <a:ext uri="{FF2B5EF4-FFF2-40B4-BE49-F238E27FC236}">
-                <a16:creationId xmlns:a16="http://schemas.microsoft.com/office/drawing/2014/main" id="{44581D0E-ECDE-53E2-A59F-457425ECCC88}"/>
-              </a:ext>
-            </a:extLst>
-          </p:cNvPr>
-          <p:cNvSpPr txBox="1"/>
-          <p:nvPr/>
-        </p:nvSpPr>
-        <p:spPr>
-          <a:xfrm>
-            <a:off x="5618671" y="110938"/>
-            <a:ext cx="301686" cy="369332"/>
-          </a:xfrm>
-          <a:prstGeom prst="rect">
-            <a:avLst/>
-          </a:prstGeom>
-          <a:noFill/>
-        </p:spPr>
-        <p:txBody>
-          <a:bodyPr wrap="none" rtlCol="0">
-            <a:spAutoFit/>
-          </a:bodyPr>
-          <a:lstStyle/>
-          <a:p>
-            <a:r>
-              <a:rPr lang="en-CA"/>
-              <a:t>2</a:t>
-            </a:r>
-          </a:p>
-        </p:txBody>
-      </p:sp>
-      <p:sp>
-        <p:nvSpPr>
-          <p:cNvPr id="10" name="TextBox 9">
-            <a:extLst>
-              <a:ext uri="{FF2B5EF4-FFF2-40B4-BE49-F238E27FC236}">
-                <a16:creationId xmlns:a16="http://schemas.microsoft.com/office/drawing/2014/main" id="{D02B5B28-6167-767E-10DA-5171C9460C3E}"/>
-              </a:ext>
-            </a:extLst>
-          </p:cNvPr>
-          <p:cNvSpPr txBox="1"/>
-          <p:nvPr/>
-        </p:nvSpPr>
-        <p:spPr>
-          <a:xfrm>
-            <a:off x="336081" y="2382113"/>
-            <a:ext cx="301686" cy="369332"/>
-          </a:xfrm>
-          <a:prstGeom prst="rect">
-            <a:avLst/>
-          </a:prstGeom>
-          <a:noFill/>
-        </p:spPr>
-        <p:txBody>
-          <a:bodyPr wrap="none" rtlCol="0">
-            <a:spAutoFit/>
-          </a:bodyPr>
-          <a:lstStyle/>
-          <a:p>
-            <a:r>
-              <a:rPr lang="en-CA"/>
-              <a:t>3</a:t>
-            </a:r>
-          </a:p>
-        </p:txBody>
-      </p:sp>
-      <p:pic>
-        <p:nvPicPr>
-          <p:cNvPr id="12" name="Picture 11">
-            <a:extLst>
-              <a:ext uri="{FF2B5EF4-FFF2-40B4-BE49-F238E27FC236}">
-                <a16:creationId xmlns:a16="http://schemas.microsoft.com/office/drawing/2014/main" id="{D9B5BE92-25B3-ABF9-E909-547CB0F307D8}"/>
-              </a:ext>
-            </a:extLst>
-          </p:cNvPr>
-          <p:cNvPicPr>
-            <a:picLocks noChangeAspect="1"/>
-          </p:cNvPicPr>
-          <p:nvPr/>
-        </p:nvPicPr>
-        <p:blipFill>
-          <a:blip r:embed="rId5"/>
-          <a:stretch>
-            <a:fillRect/>
-          </a:stretch>
-        </p:blipFill>
-        <p:spPr>
-          <a:xfrm>
-            <a:off x="5524774" y="3576358"/>
-            <a:ext cx="4305901" cy="2991267"/>
-          </a:xfrm>
-          <a:prstGeom prst="rect">
-            <a:avLst/>
-          </a:prstGeom>
-          <a:ln>
+          <a:ln w="47625">
             <a:solidFill>
-              <a:schemeClr val="tx1"/>
+              <a:schemeClr val="accent2"/>
             </a:solidFill>
           </a:ln>
         </p:spPr>
-      </p:pic>
-      <p:sp>
-        <p:nvSpPr>
-          <p:cNvPr id="13" name="TextBox 12">
-            <a:extLst>
-              <a:ext uri="{FF2B5EF4-FFF2-40B4-BE49-F238E27FC236}">
-                <a16:creationId xmlns:a16="http://schemas.microsoft.com/office/drawing/2014/main" id="{58A46CE0-EC7E-662E-11EA-790DC74FFF7D}"/>
-              </a:ext>
-            </a:extLst>
-          </p:cNvPr>
-          <p:cNvSpPr txBox="1"/>
-          <p:nvPr/>
-        </p:nvSpPr>
-        <p:spPr>
-          <a:xfrm>
-            <a:off x="5223088" y="3429000"/>
-            <a:ext cx="301686" cy="369332"/>
-          </a:xfrm>
-          <a:prstGeom prst="rect">
-            <a:avLst/>
-          </a:prstGeom>
-          <a:noFill/>
-        </p:spPr>
-        <p:txBody>
-          <a:bodyPr wrap="none" rtlCol="0">
-            <a:spAutoFit/>
-          </a:bodyPr>
-          <a:lstStyle/>
-          <a:p>
-            <a:r>
-              <a:rPr lang="en-CA"/>
-              <a:t>4</a:t>
-            </a:r>
+        <p:style>
+          <a:lnRef idx="2">
+            <a:schemeClr val="accent1">
+              <a:shade val="15000"/>
+            </a:schemeClr>
+          </a:lnRef>
+          <a:fillRef idx="1">
+            <a:schemeClr val="accent1"/>
+          </a:fillRef>
+          <a:effectRef idx="0">
+            <a:schemeClr val="accent1"/>
+          </a:effectRef>
+          <a:fontRef idx="minor">
+            <a:schemeClr val="lt1"/>
+          </a:fontRef>
+        </p:style>
+        <p:txBody>
+          <a:bodyPr rtlCol="0" anchor="ctr"/>
+          <a:lstStyle/>
+          <a:p>
+            <a:pPr algn="ctr"/>
+            <a:endParaRPr lang="en-CA"/>
           </a:p>
         </p:txBody>
       </p:sp>
     </p:spTree>
     <p:extLst>
       <p:ext uri="{BB962C8B-B14F-4D97-AF65-F5344CB8AC3E}">
-        <p14:creationId xmlns:p14="http://schemas.microsoft.com/office/powerpoint/2010/main" val="3432582559"/>
+        <p14:creationId xmlns:p14="http://schemas.microsoft.com/office/powerpoint/2010/main" val="577845057"/>
       </p:ext>
     </p:extLst>
   </p:cSld>
@@ -3864,7 +3787,7 @@
 </p:sld>
 </file>
 
-<file path=ppt/slides/slide3.xml><?xml version="1.0" encoding="utf-8"?>
+<file path=ppt/slides/slide12.xml><?xml version="1.0" encoding="utf-8"?>
 <p:sld xmlns:a="http://schemas.openxmlformats.org/drawingml/2006/main" xmlns:r="http://schemas.openxmlformats.org/officeDocument/2006/relationships" xmlns:p="http://schemas.openxmlformats.org/presentationml/2006/main">
   <p:cSld>
     <p:spTree>
@@ -3881,12 +3804,64 @@
           <a:chExt cx="0" cy="0"/>
         </a:xfrm>
       </p:grpSpPr>
+      <p:sp>
+        <p:nvSpPr>
+          <p:cNvPr id="2" name="Rectangle 1">
+            <a:extLst>
+              <a:ext uri="{FF2B5EF4-FFF2-40B4-BE49-F238E27FC236}">
+                <a16:creationId xmlns:a16="http://schemas.microsoft.com/office/drawing/2014/main" id="{B31E72B7-CA73-B08D-567B-F8E97222FF74}"/>
+              </a:ext>
+            </a:extLst>
+          </p:cNvPr>
+          <p:cNvSpPr/>
+          <p:nvPr/>
+        </p:nvSpPr>
+        <p:spPr>
+          <a:xfrm>
+            <a:off x="3476626" y="1381126"/>
+            <a:ext cx="4057650" cy="1809750"/>
+          </a:xfrm>
+          <a:prstGeom prst="rect">
+            <a:avLst/>
+          </a:prstGeom>
+          <a:solidFill>
+            <a:schemeClr val="bg1"/>
+          </a:solidFill>
+          <a:ln>
+            <a:noFill/>
+          </a:ln>
+        </p:spPr>
+        <p:style>
+          <a:lnRef idx="2">
+            <a:schemeClr val="accent1">
+              <a:shade val="15000"/>
+            </a:schemeClr>
+          </a:lnRef>
+          <a:fillRef idx="1">
+            <a:schemeClr val="accent1"/>
+          </a:fillRef>
+          <a:effectRef idx="0">
+            <a:schemeClr val="accent1"/>
+          </a:effectRef>
+          <a:fontRef idx="minor">
+            <a:schemeClr val="lt1"/>
+          </a:fontRef>
+        </p:style>
+        <p:txBody>
+          <a:bodyPr rtlCol="0" anchor="ctr"/>
+          <a:lstStyle/>
+          <a:p>
+            <a:pPr algn="ctr"/>
+            <a:endParaRPr lang="en-CA"/>
+          </a:p>
+        </p:txBody>
+      </p:sp>
       <p:pic>
         <p:nvPicPr>
-          <p:cNvPr id="3" name="Picture 2">
-            <a:extLst>
-              <a:ext uri="{FF2B5EF4-FFF2-40B4-BE49-F238E27FC236}">
-                <a16:creationId xmlns:a16="http://schemas.microsoft.com/office/drawing/2014/main" id="{B0B7D7E0-294A-EDCD-5017-6F9FF26A2063}"/>
+          <p:cNvPr id="10" name="Picture 9">
+            <a:extLst>
+              <a:ext uri="{FF2B5EF4-FFF2-40B4-BE49-F238E27FC236}">
+                <a16:creationId xmlns:a16="http://schemas.microsoft.com/office/drawing/2014/main" id="{37DD410A-1074-BBFA-828A-97A9EA8E3AEF}"/>
               </a:ext>
             </a:extLst>
           </p:cNvPr>
@@ -3903,78 +3878,23 @@
         </p:blipFill>
         <p:spPr>
           <a:xfrm>
-            <a:off x="567508" y="522621"/>
-            <a:ext cx="3916264" cy="5394853"/>
+            <a:off x="3633599" y="1642614"/>
+            <a:ext cx="3753374" cy="1257475"/>
           </a:xfrm>
           <a:prstGeom prst="rect">
             <a:avLst/>
           </a:prstGeom>
-        </p:spPr>
-      </p:pic>
-      <p:pic>
-        <p:nvPicPr>
-          <p:cNvPr id="5" name="Picture 4">
-            <a:extLst>
-              <a:ext uri="{FF2B5EF4-FFF2-40B4-BE49-F238E27FC236}">
-                <a16:creationId xmlns:a16="http://schemas.microsoft.com/office/drawing/2014/main" id="{C9AD6573-0BCB-79A9-137E-77D706528361}"/>
-              </a:ext>
-            </a:extLst>
-          </p:cNvPr>
-          <p:cNvPicPr>
-            <a:picLocks noChangeAspect="1"/>
-          </p:cNvPicPr>
-          <p:nvPr/>
-        </p:nvPicPr>
-        <p:blipFill>
-          <a:blip r:embed="rId3"/>
-          <a:stretch>
-            <a:fillRect/>
-          </a:stretch>
-        </p:blipFill>
-        <p:spPr>
-          <a:xfrm>
-            <a:off x="2766329" y="2647406"/>
-            <a:ext cx="3087486" cy="3507144"/>
-          </a:xfrm>
-          <a:prstGeom prst="rect">
-            <a:avLst/>
-          </a:prstGeom>
-        </p:spPr>
-      </p:pic>
-      <p:pic>
-        <p:nvPicPr>
-          <p:cNvPr id="7" name="Picture 6">
-            <a:extLst>
-              <a:ext uri="{FF2B5EF4-FFF2-40B4-BE49-F238E27FC236}">
-                <a16:creationId xmlns:a16="http://schemas.microsoft.com/office/drawing/2014/main" id="{1B89A55D-1D19-F264-A34A-4731A6EBA0D2}"/>
-              </a:ext>
-            </a:extLst>
-          </p:cNvPr>
-          <p:cNvPicPr>
-            <a:picLocks noChangeAspect="1"/>
-          </p:cNvPicPr>
-          <p:nvPr/>
-        </p:nvPicPr>
-        <p:blipFill>
-          <a:blip r:embed="rId4"/>
-          <a:stretch>
-            <a:fillRect/>
-          </a:stretch>
-        </p:blipFill>
-        <p:spPr>
-          <a:xfrm>
-            <a:off x="6096000" y="1770620"/>
-            <a:ext cx="4631229" cy="4383930"/>
-          </a:xfrm>
-          <a:prstGeom prst="rect">
-            <a:avLst/>
-          </a:prstGeom>
+          <a:ln>
+            <a:solidFill>
+              <a:schemeClr val="tx1"/>
+            </a:solidFill>
+          </a:ln>
         </p:spPr>
       </p:pic>
     </p:spTree>
     <p:extLst>
       <p:ext uri="{BB962C8B-B14F-4D97-AF65-F5344CB8AC3E}">
-        <p14:creationId xmlns:p14="http://schemas.microsoft.com/office/powerpoint/2010/main" val="314174546"/>
+        <p14:creationId xmlns:p14="http://schemas.microsoft.com/office/powerpoint/2010/main" val="964108410"/>
       </p:ext>
     </p:extLst>
   </p:cSld>
@@ -3984,7 +3904,7 @@
 </p:sld>
 </file>
 
-<file path=ppt/slides/slide4.xml><?xml version="1.0" encoding="utf-8"?>
+<file path=ppt/slides/slide13.xml><?xml version="1.0" encoding="utf-8"?>
 <p:sld xmlns:a="http://schemas.openxmlformats.org/drawingml/2006/main" xmlns:r="http://schemas.openxmlformats.org/officeDocument/2006/relationships" xmlns:p="http://schemas.openxmlformats.org/presentationml/2006/main">
   <p:cSld>
     <p:spTree>
@@ -4003,10 +3923,10 @@
       </p:grpSpPr>
       <p:sp>
         <p:nvSpPr>
-          <p:cNvPr id="4" name="Rectangle 3">
-            <a:extLst>
-              <a:ext uri="{FF2B5EF4-FFF2-40B4-BE49-F238E27FC236}">
-                <a16:creationId xmlns:a16="http://schemas.microsoft.com/office/drawing/2014/main" id="{9E6FDE31-8760-8702-42A7-7A0EABD25BB4}"/>
+          <p:cNvPr id="13" name="Rectangle 12">
+            <a:extLst>
+              <a:ext uri="{FF2B5EF4-FFF2-40B4-BE49-F238E27FC236}">
+                <a16:creationId xmlns:a16="http://schemas.microsoft.com/office/drawing/2014/main" id="{C40C316B-5156-2398-B0F3-A19E7B160FF4}"/>
               </a:ext>
             </a:extLst>
           </p:cNvPr>
@@ -4015,8 +3935,8 @@
         </p:nvSpPr>
         <p:spPr>
           <a:xfrm>
-            <a:off x="800100" y="504825"/>
-            <a:ext cx="4200525" cy="1771651"/>
+            <a:off x="4286250" y="704850"/>
+            <a:ext cx="7463026" cy="5072512"/>
           </a:xfrm>
           <a:prstGeom prst="rect">
             <a:avLst/>
@@ -4058,403 +3978,6 @@
           <p:cNvPr id="3" name="Picture 2">
             <a:extLst>
               <a:ext uri="{FF2B5EF4-FFF2-40B4-BE49-F238E27FC236}">
-                <a16:creationId xmlns:a16="http://schemas.microsoft.com/office/drawing/2014/main" id="{9282D1F6-C550-3ED1-B87B-7795ADD770BF}"/>
-              </a:ext>
-            </a:extLst>
-          </p:cNvPr>
-          <p:cNvPicPr>
-            <a:picLocks noChangeAspect="1"/>
-          </p:cNvPicPr>
-          <p:nvPr/>
-        </p:nvPicPr>
-        <p:blipFill>
-          <a:blip r:embed="rId2"/>
-          <a:stretch>
-            <a:fillRect/>
-          </a:stretch>
-        </p:blipFill>
-        <p:spPr>
-          <a:xfrm>
-            <a:off x="904596" y="852413"/>
-            <a:ext cx="4001058" cy="1057423"/>
-          </a:xfrm>
-          <a:prstGeom prst="rect">
-            <a:avLst/>
-          </a:prstGeom>
-        </p:spPr>
-      </p:pic>
-    </p:spTree>
-    <p:extLst>
-      <p:ext uri="{BB962C8B-B14F-4D97-AF65-F5344CB8AC3E}">
-        <p14:creationId xmlns:p14="http://schemas.microsoft.com/office/powerpoint/2010/main" val="1675951217"/>
-      </p:ext>
-    </p:extLst>
-  </p:cSld>
-  <p:clrMapOvr>
-    <a:masterClrMapping/>
-  </p:clrMapOvr>
-</p:sld>
-</file>
-
-<file path=ppt/slides/slide5.xml><?xml version="1.0" encoding="utf-8"?>
-<p:sld xmlns:a="http://schemas.openxmlformats.org/drawingml/2006/main" xmlns:r="http://schemas.openxmlformats.org/officeDocument/2006/relationships" xmlns:p="http://schemas.openxmlformats.org/presentationml/2006/main">
-  <p:cSld>
-    <p:spTree>
-      <p:nvGrpSpPr>
-        <p:cNvPr id="1" name=""/>
-        <p:cNvGrpSpPr/>
-        <p:nvPr/>
-      </p:nvGrpSpPr>
-      <p:grpSpPr>
-        <a:xfrm>
-          <a:off x="0" y="0"/>
-          <a:ext cx="0" cy="0"/>
-          <a:chOff x="0" y="0"/>
-          <a:chExt cx="0" cy="0"/>
-        </a:xfrm>
-      </p:grpSpPr>
-      <p:sp>
-        <p:nvSpPr>
-          <p:cNvPr id="7" name="Rectangle 6">
-            <a:extLst>
-              <a:ext uri="{FF2B5EF4-FFF2-40B4-BE49-F238E27FC236}">
-                <a16:creationId xmlns:a16="http://schemas.microsoft.com/office/drawing/2014/main" id="{28DC8F54-824A-8518-D7E2-A78560480AE5}"/>
-              </a:ext>
-            </a:extLst>
-          </p:cNvPr>
-          <p:cNvSpPr/>
-          <p:nvPr/>
-        </p:nvSpPr>
-        <p:spPr>
-          <a:xfrm>
-            <a:off x="752476" y="600075"/>
-            <a:ext cx="6838950" cy="3438525"/>
-          </a:xfrm>
-          <a:prstGeom prst="rect">
-            <a:avLst/>
-          </a:prstGeom>
-          <a:solidFill>
-            <a:schemeClr val="bg1"/>
-          </a:solidFill>
-          <a:ln>
-            <a:noFill/>
-          </a:ln>
-        </p:spPr>
-        <p:style>
-          <a:lnRef idx="2">
-            <a:schemeClr val="accent1">
-              <a:shade val="15000"/>
-            </a:schemeClr>
-          </a:lnRef>
-          <a:fillRef idx="1">
-            <a:schemeClr val="accent1"/>
-          </a:fillRef>
-          <a:effectRef idx="0">
-            <a:schemeClr val="accent1"/>
-          </a:effectRef>
-          <a:fontRef idx="minor">
-            <a:schemeClr val="lt1"/>
-          </a:fontRef>
-        </p:style>
-        <p:txBody>
-          <a:bodyPr rtlCol="0" anchor="ctr"/>
-          <a:lstStyle/>
-          <a:p>
-            <a:pPr algn="ctr"/>
-            <a:endParaRPr lang="en-CA"/>
-          </a:p>
-        </p:txBody>
-      </p:sp>
-      <p:pic>
-        <p:nvPicPr>
-          <p:cNvPr id="3" name="Picture 2">
-            <a:extLst>
-              <a:ext uri="{FF2B5EF4-FFF2-40B4-BE49-F238E27FC236}">
-                <a16:creationId xmlns:a16="http://schemas.microsoft.com/office/drawing/2014/main" id="{C2775D54-B9E1-3926-F98A-3366B1BD498A}"/>
-              </a:ext>
-            </a:extLst>
-          </p:cNvPr>
-          <p:cNvPicPr>
-            <a:picLocks noChangeAspect="1"/>
-          </p:cNvPicPr>
-          <p:nvPr/>
-        </p:nvPicPr>
-        <p:blipFill rotWithShape="1">
-          <a:blip r:embed="rId2"/>
-          <a:srcRect r="29910" b="57927"/>
-          <a:stretch/>
-        </p:blipFill>
-        <p:spPr>
-          <a:xfrm>
-            <a:off x="847051" y="971552"/>
-            <a:ext cx="6544349" cy="2615061"/>
-          </a:xfrm>
-          <a:prstGeom prst="rect">
-            <a:avLst/>
-          </a:prstGeom>
-          <a:ln>
-            <a:solidFill>
-              <a:schemeClr val="tx1"/>
-            </a:solidFill>
-          </a:ln>
-        </p:spPr>
-      </p:pic>
-      <p:sp>
-        <p:nvSpPr>
-          <p:cNvPr id="4" name="Oval 3">
-            <a:extLst>
-              <a:ext uri="{FF2B5EF4-FFF2-40B4-BE49-F238E27FC236}">
-                <a16:creationId xmlns:a16="http://schemas.microsoft.com/office/drawing/2014/main" id="{F7149A0A-24C4-2191-7E81-FD333A4C9481}"/>
-              </a:ext>
-            </a:extLst>
-          </p:cNvPr>
-          <p:cNvSpPr/>
-          <p:nvPr/>
-        </p:nvSpPr>
-        <p:spPr>
-          <a:xfrm>
-            <a:off x="5419725" y="3310387"/>
-            <a:ext cx="676275" cy="276226"/>
-          </a:xfrm>
-          <a:prstGeom prst="ellipse">
-            <a:avLst/>
-          </a:prstGeom>
-          <a:noFill/>
-          <a:ln w="47625">
-            <a:solidFill>
-              <a:schemeClr val="accent2"/>
-            </a:solidFill>
-          </a:ln>
-        </p:spPr>
-        <p:style>
-          <a:lnRef idx="2">
-            <a:schemeClr val="accent1">
-              <a:shade val="15000"/>
-            </a:schemeClr>
-          </a:lnRef>
-          <a:fillRef idx="1">
-            <a:schemeClr val="accent1"/>
-          </a:fillRef>
-          <a:effectRef idx="0">
-            <a:schemeClr val="accent1"/>
-          </a:effectRef>
-          <a:fontRef idx="minor">
-            <a:schemeClr val="lt1"/>
-          </a:fontRef>
-        </p:style>
-        <p:txBody>
-          <a:bodyPr rtlCol="0" anchor="ctr"/>
-          <a:lstStyle/>
-          <a:p>
-            <a:pPr algn="ctr"/>
-            <a:endParaRPr lang="en-CA"/>
-          </a:p>
-        </p:txBody>
-      </p:sp>
-    </p:spTree>
-    <p:extLst>
-      <p:ext uri="{BB962C8B-B14F-4D97-AF65-F5344CB8AC3E}">
-        <p14:creationId xmlns:p14="http://schemas.microsoft.com/office/powerpoint/2010/main" val="577845057"/>
-      </p:ext>
-    </p:extLst>
-  </p:cSld>
-  <p:clrMapOvr>
-    <a:masterClrMapping/>
-  </p:clrMapOvr>
-</p:sld>
-</file>
-
-<file path=ppt/slides/slide6.xml><?xml version="1.0" encoding="utf-8"?>
-<p:sld xmlns:a="http://schemas.openxmlformats.org/drawingml/2006/main" xmlns:r="http://schemas.openxmlformats.org/officeDocument/2006/relationships" xmlns:p="http://schemas.openxmlformats.org/presentationml/2006/main">
-  <p:cSld>
-    <p:spTree>
-      <p:nvGrpSpPr>
-        <p:cNvPr id="1" name=""/>
-        <p:cNvGrpSpPr/>
-        <p:nvPr/>
-      </p:nvGrpSpPr>
-      <p:grpSpPr>
-        <a:xfrm>
-          <a:off x="0" y="0"/>
-          <a:ext cx="0" cy="0"/>
-          <a:chOff x="0" y="0"/>
-          <a:chExt cx="0" cy="0"/>
-        </a:xfrm>
-      </p:grpSpPr>
-      <p:sp>
-        <p:nvSpPr>
-          <p:cNvPr id="2" name="Rectangle 1">
-            <a:extLst>
-              <a:ext uri="{FF2B5EF4-FFF2-40B4-BE49-F238E27FC236}">
-                <a16:creationId xmlns:a16="http://schemas.microsoft.com/office/drawing/2014/main" id="{B31E72B7-CA73-B08D-567B-F8E97222FF74}"/>
-              </a:ext>
-            </a:extLst>
-          </p:cNvPr>
-          <p:cNvSpPr/>
-          <p:nvPr/>
-        </p:nvSpPr>
-        <p:spPr>
-          <a:xfrm>
-            <a:off x="3476626" y="1381126"/>
-            <a:ext cx="4057650" cy="1809750"/>
-          </a:xfrm>
-          <a:prstGeom prst="rect">
-            <a:avLst/>
-          </a:prstGeom>
-          <a:solidFill>
-            <a:schemeClr val="bg1"/>
-          </a:solidFill>
-          <a:ln>
-            <a:noFill/>
-          </a:ln>
-        </p:spPr>
-        <p:style>
-          <a:lnRef idx="2">
-            <a:schemeClr val="accent1">
-              <a:shade val="15000"/>
-            </a:schemeClr>
-          </a:lnRef>
-          <a:fillRef idx="1">
-            <a:schemeClr val="accent1"/>
-          </a:fillRef>
-          <a:effectRef idx="0">
-            <a:schemeClr val="accent1"/>
-          </a:effectRef>
-          <a:fontRef idx="minor">
-            <a:schemeClr val="lt1"/>
-          </a:fontRef>
-        </p:style>
-        <p:txBody>
-          <a:bodyPr rtlCol="0" anchor="ctr"/>
-          <a:lstStyle/>
-          <a:p>
-            <a:pPr algn="ctr"/>
-            <a:endParaRPr lang="en-CA"/>
-          </a:p>
-        </p:txBody>
-      </p:sp>
-      <p:pic>
-        <p:nvPicPr>
-          <p:cNvPr id="10" name="Picture 9">
-            <a:extLst>
-              <a:ext uri="{FF2B5EF4-FFF2-40B4-BE49-F238E27FC236}">
-                <a16:creationId xmlns:a16="http://schemas.microsoft.com/office/drawing/2014/main" id="{37DD410A-1074-BBFA-828A-97A9EA8E3AEF}"/>
-              </a:ext>
-            </a:extLst>
-          </p:cNvPr>
-          <p:cNvPicPr>
-            <a:picLocks noChangeAspect="1"/>
-          </p:cNvPicPr>
-          <p:nvPr/>
-        </p:nvPicPr>
-        <p:blipFill>
-          <a:blip r:embed="rId2"/>
-          <a:stretch>
-            <a:fillRect/>
-          </a:stretch>
-        </p:blipFill>
-        <p:spPr>
-          <a:xfrm>
-            <a:off x="3633599" y="1642614"/>
-            <a:ext cx="3753374" cy="1257475"/>
-          </a:xfrm>
-          <a:prstGeom prst="rect">
-            <a:avLst/>
-          </a:prstGeom>
-          <a:ln>
-            <a:solidFill>
-              <a:schemeClr val="tx1"/>
-            </a:solidFill>
-          </a:ln>
-        </p:spPr>
-      </p:pic>
-    </p:spTree>
-    <p:extLst>
-      <p:ext uri="{BB962C8B-B14F-4D97-AF65-F5344CB8AC3E}">
-        <p14:creationId xmlns:p14="http://schemas.microsoft.com/office/powerpoint/2010/main" val="964108410"/>
-      </p:ext>
-    </p:extLst>
-  </p:cSld>
-  <p:clrMapOvr>
-    <a:masterClrMapping/>
-  </p:clrMapOvr>
-</p:sld>
-</file>
-
-<file path=ppt/slides/slide7.xml><?xml version="1.0" encoding="utf-8"?>
-<p:sld xmlns:a="http://schemas.openxmlformats.org/drawingml/2006/main" xmlns:r="http://schemas.openxmlformats.org/officeDocument/2006/relationships" xmlns:p="http://schemas.openxmlformats.org/presentationml/2006/main">
-  <p:cSld>
-    <p:spTree>
-      <p:nvGrpSpPr>
-        <p:cNvPr id="1" name=""/>
-        <p:cNvGrpSpPr/>
-        <p:nvPr/>
-      </p:nvGrpSpPr>
-      <p:grpSpPr>
-        <a:xfrm>
-          <a:off x="0" y="0"/>
-          <a:ext cx="0" cy="0"/>
-          <a:chOff x="0" y="0"/>
-          <a:chExt cx="0" cy="0"/>
-        </a:xfrm>
-      </p:grpSpPr>
-      <p:sp>
-        <p:nvSpPr>
-          <p:cNvPr id="13" name="Rectangle 12">
-            <a:extLst>
-              <a:ext uri="{FF2B5EF4-FFF2-40B4-BE49-F238E27FC236}">
-                <a16:creationId xmlns:a16="http://schemas.microsoft.com/office/drawing/2014/main" id="{C40C316B-5156-2398-B0F3-A19E7B160FF4}"/>
-              </a:ext>
-            </a:extLst>
-          </p:cNvPr>
-          <p:cNvSpPr/>
-          <p:nvPr/>
-        </p:nvSpPr>
-        <p:spPr>
-          <a:xfrm>
-            <a:off x="4286250" y="704850"/>
-            <a:ext cx="7463026" cy="5072512"/>
-          </a:xfrm>
-          <a:prstGeom prst="rect">
-            <a:avLst/>
-          </a:prstGeom>
-          <a:solidFill>
-            <a:schemeClr val="bg1"/>
-          </a:solidFill>
-          <a:ln>
-            <a:noFill/>
-          </a:ln>
-        </p:spPr>
-        <p:style>
-          <a:lnRef idx="2">
-            <a:schemeClr val="accent1">
-              <a:shade val="15000"/>
-            </a:schemeClr>
-          </a:lnRef>
-          <a:fillRef idx="1">
-            <a:schemeClr val="accent1"/>
-          </a:fillRef>
-          <a:effectRef idx="0">
-            <a:schemeClr val="accent1"/>
-          </a:effectRef>
-          <a:fontRef idx="minor">
-            <a:schemeClr val="lt1"/>
-          </a:fontRef>
-        </p:style>
-        <p:txBody>
-          <a:bodyPr rtlCol="0" anchor="ctr"/>
-          <a:lstStyle/>
-          <a:p>
-            <a:pPr algn="ctr"/>
-            <a:endParaRPr lang="en-CA"/>
-          </a:p>
-        </p:txBody>
-      </p:sp>
-      <p:pic>
-        <p:nvPicPr>
-          <p:cNvPr id="3" name="Picture 2">
-            <a:extLst>
-              <a:ext uri="{FF2B5EF4-FFF2-40B4-BE49-F238E27FC236}">
                 <a16:creationId xmlns:a16="http://schemas.microsoft.com/office/drawing/2014/main" id="{2A0C9EA6-F4B6-3054-A22E-C8CB4C98F8E4}"/>
               </a:ext>
             </a:extLst>
@@ -4608,7 +4131,7 @@
 </p:sld>
 </file>
 
-<file path=ppt/slides/slide8.xml><?xml version="1.0" encoding="utf-8"?>
+<file path=ppt/slides/slide14.xml><?xml version="1.0" encoding="utf-8"?>
 <p:sld xmlns:a="http://schemas.openxmlformats.org/drawingml/2006/main" xmlns:r="http://schemas.openxmlformats.org/officeDocument/2006/relationships" xmlns:p="http://schemas.openxmlformats.org/presentationml/2006/main">
   <p:cSld>
     <p:spTree>
@@ -4769,6 +4292,1329 @@
 </p:sld>
 </file>
 
+<file path=ppt/slides/slide15.xml><?xml version="1.0" encoding="utf-8"?>
+<p:sld xmlns:a="http://schemas.openxmlformats.org/drawingml/2006/main" xmlns:r="http://schemas.openxmlformats.org/officeDocument/2006/relationships" xmlns:p="http://schemas.openxmlformats.org/presentationml/2006/main">
+  <p:cSld>
+    <p:spTree>
+      <p:nvGrpSpPr>
+        <p:cNvPr id="1" name=""/>
+        <p:cNvGrpSpPr/>
+        <p:nvPr/>
+      </p:nvGrpSpPr>
+      <p:grpSpPr>
+        <a:xfrm>
+          <a:off x="0" y="0"/>
+          <a:ext cx="0" cy="0"/>
+          <a:chOff x="0" y="0"/>
+          <a:chExt cx="0" cy="0"/>
+        </a:xfrm>
+      </p:grpSpPr>
+      <p:sp>
+        <p:nvSpPr>
+          <p:cNvPr id="8" name="Oval 7">
+            <a:extLst>
+              <a:ext uri="{FF2B5EF4-FFF2-40B4-BE49-F238E27FC236}">
+                <a16:creationId xmlns:a16="http://schemas.microsoft.com/office/drawing/2014/main" id="{BD801201-31B2-1682-A270-5DDFC3C29CBD}"/>
+              </a:ext>
+            </a:extLst>
+          </p:cNvPr>
+          <p:cNvSpPr/>
+          <p:nvPr/>
+        </p:nvSpPr>
+        <p:spPr>
+          <a:xfrm>
+            <a:off x="7743825" y="4972050"/>
+            <a:ext cx="1943100" cy="400050"/>
+          </a:xfrm>
+          <a:prstGeom prst="ellipse">
+            <a:avLst/>
+          </a:prstGeom>
+          <a:noFill/>
+          <a:ln w="47625">
+            <a:solidFill>
+              <a:schemeClr val="accent2"/>
+            </a:solidFill>
+          </a:ln>
+        </p:spPr>
+        <p:style>
+          <a:lnRef idx="2">
+            <a:schemeClr val="accent1">
+              <a:shade val="15000"/>
+            </a:schemeClr>
+          </a:lnRef>
+          <a:fillRef idx="1">
+            <a:schemeClr val="accent1"/>
+          </a:fillRef>
+          <a:effectRef idx="0">
+            <a:schemeClr val="accent1"/>
+          </a:effectRef>
+          <a:fontRef idx="minor">
+            <a:schemeClr val="lt1"/>
+          </a:fontRef>
+        </p:style>
+        <p:txBody>
+          <a:bodyPr rtlCol="0" anchor="ctr"/>
+          <a:lstStyle/>
+          <a:p>
+            <a:pPr algn="ctr"/>
+            <a:endParaRPr lang="en-CA"/>
+          </a:p>
+        </p:txBody>
+      </p:sp>
+      <p:pic>
+        <p:nvPicPr>
+          <p:cNvPr id="7" name="Picture 6">
+            <a:extLst>
+              <a:ext uri="{FF2B5EF4-FFF2-40B4-BE49-F238E27FC236}">
+                <a16:creationId xmlns:a16="http://schemas.microsoft.com/office/drawing/2014/main" id="{E85A58A4-D2E4-8115-CB21-8C12D79C8009}"/>
+              </a:ext>
+            </a:extLst>
+          </p:cNvPr>
+          <p:cNvPicPr>
+            <a:picLocks noChangeAspect="1"/>
+          </p:cNvPicPr>
+          <p:nvPr/>
+        </p:nvPicPr>
+        <p:blipFill>
+          <a:blip r:embed="rId2"/>
+          <a:stretch>
+            <a:fillRect/>
+          </a:stretch>
+        </p:blipFill>
+        <p:spPr>
+          <a:xfrm>
+            <a:off x="880334" y="1276049"/>
+            <a:ext cx="10431331" cy="4305901"/>
+          </a:xfrm>
+          <a:prstGeom prst="rect">
+            <a:avLst/>
+          </a:prstGeom>
+        </p:spPr>
+      </p:pic>
+    </p:spTree>
+    <p:extLst>
+      <p:ext uri="{BB962C8B-B14F-4D97-AF65-F5344CB8AC3E}">
+        <p14:creationId xmlns:p14="http://schemas.microsoft.com/office/powerpoint/2010/main" val="366108043"/>
+      </p:ext>
+    </p:extLst>
+  </p:cSld>
+  <p:clrMapOvr>
+    <a:masterClrMapping/>
+  </p:clrMapOvr>
+</p:sld>
+</file>
+
+<file path=ppt/slides/slide2.xml><?xml version="1.0" encoding="utf-8"?>
+<p:sld xmlns:a="http://schemas.openxmlformats.org/drawingml/2006/main" xmlns:r="http://schemas.openxmlformats.org/officeDocument/2006/relationships" xmlns:p="http://schemas.openxmlformats.org/presentationml/2006/main">
+  <p:cSld>
+    <p:spTree>
+      <p:nvGrpSpPr>
+        <p:cNvPr id="1" name=""/>
+        <p:cNvGrpSpPr/>
+        <p:nvPr/>
+      </p:nvGrpSpPr>
+      <p:grpSpPr>
+        <a:xfrm>
+          <a:off x="0" y="0"/>
+          <a:ext cx="0" cy="0"/>
+          <a:chOff x="0" y="0"/>
+          <a:chExt cx="0" cy="0"/>
+        </a:xfrm>
+      </p:grpSpPr>
+      <p:pic>
+        <p:nvPicPr>
+          <p:cNvPr id="10" name="Picture 9">
+            <a:extLst>
+              <a:ext uri="{FF2B5EF4-FFF2-40B4-BE49-F238E27FC236}">
+                <a16:creationId xmlns:a16="http://schemas.microsoft.com/office/drawing/2014/main" id="{6A1A72DE-4126-E962-80B1-AC71063E29BB}"/>
+              </a:ext>
+            </a:extLst>
+          </p:cNvPr>
+          <p:cNvPicPr>
+            <a:picLocks noChangeAspect="1"/>
+          </p:cNvPicPr>
+          <p:nvPr/>
+        </p:nvPicPr>
+        <p:blipFill>
+          <a:blip r:embed="rId2"/>
+          <a:srcRect l="66959" t="36288" r="908" b="2700"/>
+          <a:stretch/>
+        </p:blipFill>
+        <p:spPr>
+          <a:xfrm>
+            <a:off x="8081554" y="2847702"/>
+            <a:ext cx="3762103" cy="2586447"/>
+          </a:xfrm>
+          <a:prstGeom prst="rect">
+            <a:avLst/>
+          </a:prstGeom>
+          <a:ln>
+            <a:solidFill>
+              <a:schemeClr val="accent1"/>
+            </a:solidFill>
+          </a:ln>
+        </p:spPr>
+      </p:pic>
+      <p:sp>
+        <p:nvSpPr>
+          <p:cNvPr id="6" name="Rectangle 5">
+            <a:extLst>
+              <a:ext uri="{FF2B5EF4-FFF2-40B4-BE49-F238E27FC236}">
+                <a16:creationId xmlns:a16="http://schemas.microsoft.com/office/drawing/2014/main" id="{32760571-B84B-2BA5-579B-40E9EECF02B3}"/>
+              </a:ext>
+            </a:extLst>
+          </p:cNvPr>
+          <p:cNvSpPr/>
+          <p:nvPr/>
+        </p:nvSpPr>
+        <p:spPr>
+          <a:xfrm>
+            <a:off x="-9525" y="1973580"/>
+            <a:ext cx="306434" cy="4610100"/>
+          </a:xfrm>
+          <a:prstGeom prst="rect">
+            <a:avLst/>
+          </a:prstGeom>
+          <a:solidFill>
+            <a:schemeClr val="bg1"/>
+          </a:solidFill>
+          <a:ln>
+            <a:noFill/>
+          </a:ln>
+        </p:spPr>
+        <p:style>
+          <a:lnRef idx="2">
+            <a:schemeClr val="accent1">
+              <a:shade val="15000"/>
+            </a:schemeClr>
+          </a:lnRef>
+          <a:fillRef idx="1">
+            <a:schemeClr val="accent1"/>
+          </a:fillRef>
+          <a:effectRef idx="0">
+            <a:schemeClr val="accent1"/>
+          </a:effectRef>
+          <a:fontRef idx="minor">
+            <a:schemeClr val="lt1"/>
+          </a:fontRef>
+        </p:style>
+        <p:txBody>
+          <a:bodyPr rtlCol="0" anchor="ctr"/>
+          <a:lstStyle/>
+          <a:p>
+            <a:pPr algn="ctr"/>
+            <a:endParaRPr lang="en-CA"/>
+          </a:p>
+        </p:txBody>
+      </p:sp>
+      <p:sp>
+        <p:nvSpPr>
+          <p:cNvPr id="8" name="Oval 7">
+            <a:extLst>
+              <a:ext uri="{FF2B5EF4-FFF2-40B4-BE49-F238E27FC236}">
+                <a16:creationId xmlns:a16="http://schemas.microsoft.com/office/drawing/2014/main" id="{72C62E71-D361-BC15-E3EF-A834F301FACB}"/>
+              </a:ext>
+            </a:extLst>
+          </p:cNvPr>
+          <p:cNvSpPr/>
+          <p:nvPr/>
+        </p:nvSpPr>
+        <p:spPr>
+          <a:xfrm>
+            <a:off x="7924801" y="4895465"/>
+            <a:ext cx="1600200" cy="653143"/>
+          </a:xfrm>
+          <a:prstGeom prst="ellipse">
+            <a:avLst/>
+          </a:prstGeom>
+          <a:noFill/>
+          <a:ln w="47625">
+            <a:solidFill>
+              <a:schemeClr val="accent2"/>
+            </a:solidFill>
+          </a:ln>
+        </p:spPr>
+        <p:style>
+          <a:lnRef idx="2">
+            <a:schemeClr val="accent1">
+              <a:shade val="15000"/>
+            </a:schemeClr>
+          </a:lnRef>
+          <a:fillRef idx="1">
+            <a:schemeClr val="accent1"/>
+          </a:fillRef>
+          <a:effectRef idx="0">
+            <a:schemeClr val="accent1"/>
+          </a:effectRef>
+          <a:fontRef idx="minor">
+            <a:schemeClr val="lt1"/>
+          </a:fontRef>
+        </p:style>
+        <p:txBody>
+          <a:bodyPr rtlCol="0" anchor="ctr"/>
+          <a:lstStyle/>
+          <a:p>
+            <a:pPr algn="ctr"/>
+            <a:endParaRPr lang="en-CA"/>
+          </a:p>
+        </p:txBody>
+      </p:sp>
+    </p:spTree>
+    <p:extLst>
+      <p:ext uri="{BB962C8B-B14F-4D97-AF65-F5344CB8AC3E}">
+        <p14:creationId xmlns:p14="http://schemas.microsoft.com/office/powerpoint/2010/main" val="3387442404"/>
+      </p:ext>
+    </p:extLst>
+  </p:cSld>
+  <p:clrMapOvr>
+    <a:masterClrMapping/>
+  </p:clrMapOvr>
+</p:sld>
+</file>
+
+<file path=ppt/slides/slide3.xml><?xml version="1.0" encoding="utf-8"?>
+<p:sld xmlns:a="http://schemas.openxmlformats.org/drawingml/2006/main" xmlns:r="http://schemas.openxmlformats.org/officeDocument/2006/relationships" xmlns:p="http://schemas.openxmlformats.org/presentationml/2006/main">
+  <p:cSld>
+    <p:spTree>
+      <p:nvGrpSpPr>
+        <p:cNvPr id="1" name=""/>
+        <p:cNvGrpSpPr/>
+        <p:nvPr/>
+      </p:nvGrpSpPr>
+      <p:grpSpPr>
+        <a:xfrm>
+          <a:off x="0" y="0"/>
+          <a:ext cx="0" cy="0"/>
+          <a:chOff x="0" y="0"/>
+          <a:chExt cx="0" cy="0"/>
+        </a:xfrm>
+      </p:grpSpPr>
+      <p:pic>
+        <p:nvPicPr>
+          <p:cNvPr id="3" name="Picture 2">
+            <a:extLst>
+              <a:ext uri="{FF2B5EF4-FFF2-40B4-BE49-F238E27FC236}">
+                <a16:creationId xmlns:a16="http://schemas.microsoft.com/office/drawing/2014/main" id="{A68F7D2F-4A4D-7ECE-E208-054B6F7BBB7E}"/>
+              </a:ext>
+            </a:extLst>
+          </p:cNvPr>
+          <p:cNvPicPr>
+            <a:picLocks noChangeAspect="1"/>
+          </p:cNvPicPr>
+          <p:nvPr/>
+        </p:nvPicPr>
+        <p:blipFill>
+          <a:blip r:embed="rId2"/>
+          <a:stretch>
+            <a:fillRect/>
+          </a:stretch>
+        </p:blipFill>
+        <p:spPr>
+          <a:xfrm>
+            <a:off x="637767" y="290375"/>
+            <a:ext cx="4887007" cy="1971950"/>
+          </a:xfrm>
+          <a:prstGeom prst="rect">
+            <a:avLst/>
+          </a:prstGeom>
+          <a:ln>
+            <a:solidFill>
+              <a:schemeClr val="tx1"/>
+            </a:solidFill>
+          </a:ln>
+        </p:spPr>
+      </p:pic>
+      <p:sp>
+        <p:nvSpPr>
+          <p:cNvPr id="2" name="Oval 1">
+            <a:extLst>
+              <a:ext uri="{FF2B5EF4-FFF2-40B4-BE49-F238E27FC236}">
+                <a16:creationId xmlns:a16="http://schemas.microsoft.com/office/drawing/2014/main" id="{FC0BC8B7-5C25-7567-9273-139111C9E197}"/>
+              </a:ext>
+            </a:extLst>
+          </p:cNvPr>
+          <p:cNvSpPr/>
+          <p:nvPr/>
+        </p:nvSpPr>
+        <p:spPr>
+          <a:xfrm>
+            <a:off x="3314700" y="1933576"/>
+            <a:ext cx="876300" cy="328750"/>
+          </a:xfrm>
+          <a:prstGeom prst="ellipse">
+            <a:avLst/>
+          </a:prstGeom>
+          <a:noFill/>
+          <a:ln w="47625">
+            <a:solidFill>
+              <a:schemeClr val="accent2"/>
+            </a:solidFill>
+          </a:ln>
+        </p:spPr>
+        <p:style>
+          <a:lnRef idx="2">
+            <a:schemeClr val="accent1">
+              <a:shade val="15000"/>
+            </a:schemeClr>
+          </a:lnRef>
+          <a:fillRef idx="1">
+            <a:schemeClr val="accent1"/>
+          </a:fillRef>
+          <a:effectRef idx="0">
+            <a:schemeClr val="accent1"/>
+          </a:effectRef>
+          <a:fontRef idx="minor">
+            <a:schemeClr val="lt1"/>
+          </a:fontRef>
+        </p:style>
+        <p:txBody>
+          <a:bodyPr rtlCol="0" anchor="ctr"/>
+          <a:lstStyle/>
+          <a:p>
+            <a:pPr algn="ctr"/>
+            <a:endParaRPr lang="en-CA"/>
+          </a:p>
+        </p:txBody>
+      </p:sp>
+      <p:pic>
+        <p:nvPicPr>
+          <p:cNvPr id="6" name="Picture 5">
+            <a:extLst>
+              <a:ext uri="{FF2B5EF4-FFF2-40B4-BE49-F238E27FC236}">
+                <a16:creationId xmlns:a16="http://schemas.microsoft.com/office/drawing/2014/main" id="{964CE425-A99E-6641-7DF8-F1EA0CE5EBD9}"/>
+              </a:ext>
+            </a:extLst>
+          </p:cNvPr>
+          <p:cNvPicPr>
+            <a:picLocks noChangeAspect="1"/>
+          </p:cNvPicPr>
+          <p:nvPr/>
+        </p:nvPicPr>
+        <p:blipFill>
+          <a:blip r:embed="rId3"/>
+          <a:srcRect t="-654" b="41403"/>
+          <a:stretch/>
+        </p:blipFill>
+        <p:spPr>
+          <a:xfrm>
+            <a:off x="5761945" y="457200"/>
+            <a:ext cx="5849166" cy="2562527"/>
+          </a:xfrm>
+          <a:prstGeom prst="rect">
+            <a:avLst/>
+          </a:prstGeom>
+          <a:ln>
+            <a:solidFill>
+              <a:schemeClr val="tx1"/>
+            </a:solidFill>
+          </a:ln>
+        </p:spPr>
+      </p:pic>
+      <p:pic>
+        <p:nvPicPr>
+          <p:cNvPr id="9" name="Picture 8">
+            <a:extLst>
+              <a:ext uri="{FF2B5EF4-FFF2-40B4-BE49-F238E27FC236}">
+                <a16:creationId xmlns:a16="http://schemas.microsoft.com/office/drawing/2014/main" id="{22E080F5-3C94-D4AC-008F-263F941C6DED}"/>
+              </a:ext>
+            </a:extLst>
+          </p:cNvPr>
+          <p:cNvPicPr>
+            <a:picLocks noChangeAspect="1"/>
+          </p:cNvPicPr>
+          <p:nvPr/>
+        </p:nvPicPr>
+        <p:blipFill>
+          <a:blip r:embed="rId3"/>
+          <a:srcRect t="88541"/>
+          <a:stretch/>
+        </p:blipFill>
+        <p:spPr>
+          <a:xfrm>
+            <a:off x="5762625" y="2524125"/>
+            <a:ext cx="5849166" cy="495602"/>
+          </a:xfrm>
+          <a:prstGeom prst="rect">
+            <a:avLst/>
+          </a:prstGeom>
+        </p:spPr>
+      </p:pic>
+      <p:sp>
+        <p:nvSpPr>
+          <p:cNvPr id="10" name="Oval 9">
+            <a:extLst>
+              <a:ext uri="{FF2B5EF4-FFF2-40B4-BE49-F238E27FC236}">
+                <a16:creationId xmlns:a16="http://schemas.microsoft.com/office/drawing/2014/main" id="{9F11F6C7-5D9F-7FA7-3DE0-C003766E8A63}"/>
+              </a:ext>
+            </a:extLst>
+          </p:cNvPr>
+          <p:cNvSpPr/>
+          <p:nvPr/>
+        </p:nvSpPr>
+        <p:spPr>
+          <a:xfrm>
+            <a:off x="9886950" y="2609850"/>
+            <a:ext cx="971550" cy="386202"/>
+          </a:xfrm>
+          <a:prstGeom prst="ellipse">
+            <a:avLst/>
+          </a:prstGeom>
+          <a:noFill/>
+          <a:ln w="47625">
+            <a:solidFill>
+              <a:schemeClr val="accent2"/>
+            </a:solidFill>
+          </a:ln>
+        </p:spPr>
+        <p:style>
+          <a:lnRef idx="2">
+            <a:schemeClr val="accent1">
+              <a:shade val="15000"/>
+            </a:schemeClr>
+          </a:lnRef>
+          <a:fillRef idx="1">
+            <a:schemeClr val="accent1"/>
+          </a:fillRef>
+          <a:effectRef idx="0">
+            <a:schemeClr val="accent1"/>
+          </a:effectRef>
+          <a:fontRef idx="minor">
+            <a:schemeClr val="lt1"/>
+          </a:fontRef>
+        </p:style>
+        <p:txBody>
+          <a:bodyPr rtlCol="0" anchor="ctr"/>
+          <a:lstStyle/>
+          <a:p>
+            <a:pPr algn="ctr"/>
+            <a:endParaRPr lang="en-CA"/>
+          </a:p>
+        </p:txBody>
+      </p:sp>
+    </p:spTree>
+    <p:extLst>
+      <p:ext uri="{BB962C8B-B14F-4D97-AF65-F5344CB8AC3E}">
+        <p14:creationId xmlns:p14="http://schemas.microsoft.com/office/powerpoint/2010/main" val="4234653831"/>
+      </p:ext>
+    </p:extLst>
+  </p:cSld>
+  <p:clrMapOvr>
+    <a:masterClrMapping/>
+  </p:clrMapOvr>
+</p:sld>
+</file>
+
+<file path=ppt/slides/slide4.xml><?xml version="1.0" encoding="utf-8"?>
+<p:sld xmlns:a="http://schemas.openxmlformats.org/drawingml/2006/main" xmlns:r="http://schemas.openxmlformats.org/officeDocument/2006/relationships" xmlns:p="http://schemas.openxmlformats.org/presentationml/2006/main">
+  <p:cSld>
+    <p:spTree>
+      <p:nvGrpSpPr>
+        <p:cNvPr id="1" name=""/>
+        <p:cNvGrpSpPr/>
+        <p:nvPr/>
+      </p:nvGrpSpPr>
+      <p:grpSpPr>
+        <a:xfrm>
+          <a:off x="0" y="0"/>
+          <a:ext cx="0" cy="0"/>
+          <a:chOff x="0" y="0"/>
+          <a:chExt cx="0" cy="0"/>
+        </a:xfrm>
+      </p:grpSpPr>
+      <p:pic>
+        <p:nvPicPr>
+          <p:cNvPr id="6" name="Picture 5">
+            <a:extLst>
+              <a:ext uri="{FF2B5EF4-FFF2-40B4-BE49-F238E27FC236}">
+                <a16:creationId xmlns:a16="http://schemas.microsoft.com/office/drawing/2014/main" id="{E65FABC1-72EC-6874-70D9-A0559004FDDC}"/>
+              </a:ext>
+            </a:extLst>
+          </p:cNvPr>
+          <p:cNvPicPr>
+            <a:picLocks noChangeAspect="1"/>
+          </p:cNvPicPr>
+          <p:nvPr/>
+        </p:nvPicPr>
+        <p:blipFill>
+          <a:blip r:embed="rId2"/>
+          <a:stretch>
+            <a:fillRect/>
+          </a:stretch>
+        </p:blipFill>
+        <p:spPr>
+          <a:xfrm>
+            <a:off x="885258" y="218627"/>
+            <a:ext cx="8116433" cy="3210373"/>
+          </a:xfrm>
+          <a:prstGeom prst="rect">
+            <a:avLst/>
+          </a:prstGeom>
+          <a:ln>
+            <a:solidFill>
+              <a:schemeClr val="tx1"/>
+            </a:solidFill>
+          </a:ln>
+        </p:spPr>
+      </p:pic>
+      <p:sp>
+        <p:nvSpPr>
+          <p:cNvPr id="2" name="Oval 1">
+            <a:extLst>
+              <a:ext uri="{FF2B5EF4-FFF2-40B4-BE49-F238E27FC236}">
+                <a16:creationId xmlns:a16="http://schemas.microsoft.com/office/drawing/2014/main" id="{FC0BC8B7-5C25-7567-9273-139111C9E197}"/>
+              </a:ext>
+            </a:extLst>
+          </p:cNvPr>
+          <p:cNvSpPr/>
+          <p:nvPr/>
+        </p:nvSpPr>
+        <p:spPr>
+          <a:xfrm>
+            <a:off x="2252516" y="5343526"/>
+            <a:ext cx="876300" cy="328750"/>
+          </a:xfrm>
+          <a:prstGeom prst="ellipse">
+            <a:avLst/>
+          </a:prstGeom>
+          <a:noFill/>
+          <a:ln w="47625">
+            <a:solidFill>
+              <a:schemeClr val="accent2"/>
+            </a:solidFill>
+          </a:ln>
+        </p:spPr>
+        <p:style>
+          <a:lnRef idx="2">
+            <a:schemeClr val="accent1">
+              <a:shade val="15000"/>
+            </a:schemeClr>
+          </a:lnRef>
+          <a:fillRef idx="1">
+            <a:schemeClr val="accent1"/>
+          </a:fillRef>
+          <a:effectRef idx="0">
+            <a:schemeClr val="accent1"/>
+          </a:effectRef>
+          <a:fontRef idx="minor">
+            <a:schemeClr val="lt1"/>
+          </a:fontRef>
+        </p:style>
+        <p:txBody>
+          <a:bodyPr rtlCol="0" anchor="ctr"/>
+          <a:lstStyle/>
+          <a:p>
+            <a:pPr algn="ctr"/>
+            <a:endParaRPr lang="en-CA"/>
+          </a:p>
+        </p:txBody>
+      </p:sp>
+      <p:pic>
+        <p:nvPicPr>
+          <p:cNvPr id="14" name="Picture 13">
+            <a:extLst>
+              <a:ext uri="{FF2B5EF4-FFF2-40B4-BE49-F238E27FC236}">
+                <a16:creationId xmlns:a16="http://schemas.microsoft.com/office/drawing/2014/main" id="{780ADAA9-9647-8AB1-A554-007FC1CD0DD2}"/>
+              </a:ext>
+            </a:extLst>
+          </p:cNvPr>
+          <p:cNvPicPr>
+            <a:picLocks noChangeAspect="1"/>
+          </p:cNvPicPr>
+          <p:nvPr/>
+        </p:nvPicPr>
+        <p:blipFill>
+          <a:blip r:embed="rId3"/>
+          <a:stretch>
+            <a:fillRect/>
+          </a:stretch>
+        </p:blipFill>
+        <p:spPr>
+          <a:xfrm>
+            <a:off x="885258" y="3505211"/>
+            <a:ext cx="7668695" cy="3134162"/>
+          </a:xfrm>
+          <a:prstGeom prst="rect">
+            <a:avLst/>
+          </a:prstGeom>
+        </p:spPr>
+      </p:pic>
+    </p:spTree>
+    <p:extLst>
+      <p:ext uri="{BB962C8B-B14F-4D97-AF65-F5344CB8AC3E}">
+        <p14:creationId xmlns:p14="http://schemas.microsoft.com/office/powerpoint/2010/main" val="3432582559"/>
+      </p:ext>
+    </p:extLst>
+  </p:cSld>
+  <p:clrMapOvr>
+    <a:masterClrMapping/>
+  </p:clrMapOvr>
+</p:sld>
+</file>
+
+<file path=ppt/slides/slide5.xml><?xml version="1.0" encoding="utf-8"?>
+<p:sld xmlns:a="http://schemas.openxmlformats.org/drawingml/2006/main" xmlns:r="http://schemas.openxmlformats.org/officeDocument/2006/relationships" xmlns:p="http://schemas.openxmlformats.org/presentationml/2006/main">
+  <p:cSld>
+    <p:spTree>
+      <p:nvGrpSpPr>
+        <p:cNvPr id="1" name=""/>
+        <p:cNvGrpSpPr/>
+        <p:nvPr/>
+      </p:nvGrpSpPr>
+      <p:grpSpPr>
+        <a:xfrm>
+          <a:off x="0" y="0"/>
+          <a:ext cx="0" cy="0"/>
+          <a:chOff x="0" y="0"/>
+          <a:chExt cx="0" cy="0"/>
+        </a:xfrm>
+      </p:grpSpPr>
+      <p:pic>
+        <p:nvPicPr>
+          <p:cNvPr id="3" name="Picture 2">
+            <a:extLst>
+              <a:ext uri="{FF2B5EF4-FFF2-40B4-BE49-F238E27FC236}">
+                <a16:creationId xmlns:a16="http://schemas.microsoft.com/office/drawing/2014/main" id="{B0B7D7E0-294A-EDCD-5017-6F9FF26A2063}"/>
+              </a:ext>
+            </a:extLst>
+          </p:cNvPr>
+          <p:cNvPicPr>
+            <a:picLocks noChangeAspect="1"/>
+          </p:cNvPicPr>
+          <p:nvPr/>
+        </p:nvPicPr>
+        <p:blipFill>
+          <a:blip r:embed="rId2"/>
+          <a:srcRect b="71728"/>
+          <a:stretch/>
+        </p:blipFill>
+        <p:spPr>
+          <a:xfrm>
+            <a:off x="572271" y="522622"/>
+            <a:ext cx="3916264" cy="1525254"/>
+          </a:xfrm>
+          <a:prstGeom prst="rect">
+            <a:avLst/>
+          </a:prstGeom>
+        </p:spPr>
+      </p:pic>
+      <p:pic>
+        <p:nvPicPr>
+          <p:cNvPr id="5" name="Picture 4">
+            <a:extLst>
+              <a:ext uri="{FF2B5EF4-FFF2-40B4-BE49-F238E27FC236}">
+                <a16:creationId xmlns:a16="http://schemas.microsoft.com/office/drawing/2014/main" id="{C9AD6573-0BCB-79A9-137E-77D706528361}"/>
+              </a:ext>
+            </a:extLst>
+          </p:cNvPr>
+          <p:cNvPicPr>
+            <a:picLocks noChangeAspect="1"/>
+          </p:cNvPicPr>
+          <p:nvPr/>
+        </p:nvPicPr>
+        <p:blipFill>
+          <a:blip r:embed="rId3"/>
+          <a:stretch>
+            <a:fillRect/>
+          </a:stretch>
+        </p:blipFill>
+        <p:spPr>
+          <a:xfrm>
+            <a:off x="2175779" y="2961731"/>
+            <a:ext cx="3087486" cy="3507144"/>
+          </a:xfrm>
+          <a:prstGeom prst="rect">
+            <a:avLst/>
+          </a:prstGeom>
+        </p:spPr>
+      </p:pic>
+      <p:pic>
+        <p:nvPicPr>
+          <p:cNvPr id="2" name="Picture 1">
+            <a:extLst>
+              <a:ext uri="{FF2B5EF4-FFF2-40B4-BE49-F238E27FC236}">
+                <a16:creationId xmlns:a16="http://schemas.microsoft.com/office/drawing/2014/main" id="{41C12CA7-BCFE-B83E-4425-890E5641F632}"/>
+              </a:ext>
+            </a:extLst>
+          </p:cNvPr>
+          <p:cNvPicPr>
+            <a:picLocks noChangeAspect="1"/>
+          </p:cNvPicPr>
+          <p:nvPr/>
+        </p:nvPicPr>
+        <p:blipFill>
+          <a:blip r:embed="rId4"/>
+          <a:srcRect t="94488"/>
+          <a:stretch/>
+        </p:blipFill>
+        <p:spPr>
+          <a:xfrm>
+            <a:off x="572271" y="2047876"/>
+            <a:ext cx="3916264" cy="297125"/>
+          </a:xfrm>
+          <a:prstGeom prst="rect">
+            <a:avLst/>
+          </a:prstGeom>
+        </p:spPr>
+      </p:pic>
+      <p:sp>
+        <p:nvSpPr>
+          <p:cNvPr id="8" name="Oval 7">
+            <a:extLst>
+              <a:ext uri="{FF2B5EF4-FFF2-40B4-BE49-F238E27FC236}">
+                <a16:creationId xmlns:a16="http://schemas.microsoft.com/office/drawing/2014/main" id="{07116172-8FBC-836A-DF1B-12BB832B1442}"/>
+              </a:ext>
+            </a:extLst>
+          </p:cNvPr>
+          <p:cNvSpPr/>
+          <p:nvPr/>
+        </p:nvSpPr>
+        <p:spPr>
+          <a:xfrm>
+            <a:off x="3943351" y="5705475"/>
+            <a:ext cx="1234304" cy="355420"/>
+          </a:xfrm>
+          <a:prstGeom prst="ellipse">
+            <a:avLst/>
+          </a:prstGeom>
+          <a:noFill/>
+          <a:ln w="47625">
+            <a:solidFill>
+              <a:schemeClr val="accent2"/>
+            </a:solidFill>
+          </a:ln>
+        </p:spPr>
+        <p:style>
+          <a:lnRef idx="2">
+            <a:schemeClr val="accent1">
+              <a:shade val="15000"/>
+            </a:schemeClr>
+          </a:lnRef>
+          <a:fillRef idx="1">
+            <a:schemeClr val="accent1"/>
+          </a:fillRef>
+          <a:effectRef idx="0">
+            <a:schemeClr val="accent1"/>
+          </a:effectRef>
+          <a:fontRef idx="minor">
+            <a:schemeClr val="lt1"/>
+          </a:fontRef>
+        </p:style>
+        <p:txBody>
+          <a:bodyPr rtlCol="0" anchor="ctr"/>
+          <a:lstStyle/>
+          <a:p>
+            <a:pPr algn="ctr"/>
+            <a:endParaRPr lang="en-CA"/>
+          </a:p>
+        </p:txBody>
+      </p:sp>
+      <p:pic>
+        <p:nvPicPr>
+          <p:cNvPr id="10" name="Picture 9">
+            <a:extLst>
+              <a:ext uri="{FF2B5EF4-FFF2-40B4-BE49-F238E27FC236}">
+                <a16:creationId xmlns:a16="http://schemas.microsoft.com/office/drawing/2014/main" id="{45AC736F-6B94-9829-DDDD-0A80F91BF3C7}"/>
+              </a:ext>
+            </a:extLst>
+          </p:cNvPr>
+          <p:cNvPicPr>
+            <a:picLocks noChangeAspect="1"/>
+          </p:cNvPicPr>
+          <p:nvPr/>
+        </p:nvPicPr>
+        <p:blipFill>
+          <a:blip r:embed="rId5"/>
+          <a:stretch>
+            <a:fillRect/>
+          </a:stretch>
+        </p:blipFill>
+        <p:spPr>
+          <a:xfrm>
+            <a:off x="5399036" y="773157"/>
+            <a:ext cx="6220693" cy="1571844"/>
+          </a:xfrm>
+          <a:prstGeom prst="rect">
+            <a:avLst/>
+          </a:prstGeom>
+        </p:spPr>
+      </p:pic>
+    </p:spTree>
+    <p:extLst>
+      <p:ext uri="{BB962C8B-B14F-4D97-AF65-F5344CB8AC3E}">
+        <p14:creationId xmlns:p14="http://schemas.microsoft.com/office/powerpoint/2010/main" val="314174546"/>
+      </p:ext>
+    </p:extLst>
+  </p:cSld>
+  <p:clrMapOvr>
+    <a:masterClrMapping/>
+  </p:clrMapOvr>
+</p:sld>
+</file>
+
+<file path=ppt/slides/slide6.xml><?xml version="1.0" encoding="utf-8"?>
+<p:sld xmlns:a="http://schemas.openxmlformats.org/drawingml/2006/main" xmlns:r="http://schemas.openxmlformats.org/officeDocument/2006/relationships" xmlns:p="http://schemas.openxmlformats.org/presentationml/2006/main">
+  <p:cSld>
+    <p:spTree>
+      <p:nvGrpSpPr>
+        <p:cNvPr id="1" name=""/>
+        <p:cNvGrpSpPr/>
+        <p:nvPr/>
+      </p:nvGrpSpPr>
+      <p:grpSpPr>
+        <a:xfrm>
+          <a:off x="0" y="0"/>
+          <a:ext cx="0" cy="0"/>
+          <a:chOff x="0" y="0"/>
+          <a:chExt cx="0" cy="0"/>
+        </a:xfrm>
+      </p:grpSpPr>
+      <p:pic>
+        <p:nvPicPr>
+          <p:cNvPr id="3" name="Picture 2">
+            <a:extLst>
+              <a:ext uri="{FF2B5EF4-FFF2-40B4-BE49-F238E27FC236}">
+                <a16:creationId xmlns:a16="http://schemas.microsoft.com/office/drawing/2014/main" id="{E8205430-76C2-592D-948B-90669E5A5FAC}"/>
+              </a:ext>
+            </a:extLst>
+          </p:cNvPr>
+          <p:cNvPicPr>
+            <a:picLocks noChangeAspect="1"/>
+          </p:cNvPicPr>
+          <p:nvPr/>
+        </p:nvPicPr>
+        <p:blipFill>
+          <a:blip r:embed="rId2"/>
+          <a:stretch>
+            <a:fillRect/>
+          </a:stretch>
+        </p:blipFill>
+        <p:spPr>
+          <a:xfrm>
+            <a:off x="5973941" y="572880"/>
+            <a:ext cx="5887272" cy="5572903"/>
+          </a:xfrm>
+          <a:prstGeom prst="rect">
+            <a:avLst/>
+          </a:prstGeom>
+        </p:spPr>
+      </p:pic>
+      <p:sp>
+        <p:nvSpPr>
+          <p:cNvPr id="4" name="Oval 3">
+            <a:extLst>
+              <a:ext uri="{FF2B5EF4-FFF2-40B4-BE49-F238E27FC236}">
+                <a16:creationId xmlns:a16="http://schemas.microsoft.com/office/drawing/2014/main" id="{90EB8330-D052-D24F-F09E-F73F4AE455F5}"/>
+              </a:ext>
+            </a:extLst>
+          </p:cNvPr>
+          <p:cNvSpPr/>
+          <p:nvPr/>
+        </p:nvSpPr>
+        <p:spPr>
+          <a:xfrm>
+            <a:off x="9691008" y="5182961"/>
+            <a:ext cx="1234304" cy="355420"/>
+          </a:xfrm>
+          <a:prstGeom prst="ellipse">
+            <a:avLst/>
+          </a:prstGeom>
+          <a:noFill/>
+          <a:ln w="47625">
+            <a:solidFill>
+              <a:schemeClr val="accent2"/>
+            </a:solidFill>
+          </a:ln>
+        </p:spPr>
+        <p:style>
+          <a:lnRef idx="2">
+            <a:schemeClr val="accent1">
+              <a:shade val="15000"/>
+            </a:schemeClr>
+          </a:lnRef>
+          <a:fillRef idx="1">
+            <a:schemeClr val="accent1"/>
+          </a:fillRef>
+          <a:effectRef idx="0">
+            <a:schemeClr val="accent1"/>
+          </a:effectRef>
+          <a:fontRef idx="minor">
+            <a:schemeClr val="lt1"/>
+          </a:fontRef>
+        </p:style>
+        <p:txBody>
+          <a:bodyPr rtlCol="0" anchor="ctr"/>
+          <a:lstStyle/>
+          <a:p>
+            <a:pPr algn="ctr"/>
+            <a:endParaRPr lang="en-CA"/>
+          </a:p>
+        </p:txBody>
+      </p:sp>
+      <p:pic>
+        <p:nvPicPr>
+          <p:cNvPr id="6" name="Picture 5">
+            <a:extLst>
+              <a:ext uri="{FF2B5EF4-FFF2-40B4-BE49-F238E27FC236}">
+                <a16:creationId xmlns:a16="http://schemas.microsoft.com/office/drawing/2014/main" id="{E6500350-3F63-D9B4-EFF0-430FC0664E95}"/>
+              </a:ext>
+            </a:extLst>
+          </p:cNvPr>
+          <p:cNvPicPr>
+            <a:picLocks noChangeAspect="1"/>
+          </p:cNvPicPr>
+          <p:nvPr/>
+        </p:nvPicPr>
+        <p:blipFill>
+          <a:blip r:embed="rId3">
+            <a:extLst>
+              <a:ext uri="{28A0092B-C50C-407E-A947-70E740481C1C}">
+                <a14:useLocalDpi xmlns:a14="http://schemas.microsoft.com/office/drawing/2010/main" val="0"/>
+              </a:ext>
+            </a:extLst>
+          </a:blip>
+          <a:stretch>
+            <a:fillRect/>
+          </a:stretch>
+        </p:blipFill>
+        <p:spPr>
+          <a:xfrm>
+            <a:off x="0" y="572879"/>
+            <a:ext cx="5887272" cy="5572903"/>
+          </a:xfrm>
+          <a:prstGeom prst="rect">
+            <a:avLst/>
+          </a:prstGeom>
+        </p:spPr>
+      </p:pic>
+      <p:sp>
+        <p:nvSpPr>
+          <p:cNvPr id="7" name="Oval 6">
+            <a:extLst>
+              <a:ext uri="{FF2B5EF4-FFF2-40B4-BE49-F238E27FC236}">
+                <a16:creationId xmlns:a16="http://schemas.microsoft.com/office/drawing/2014/main" id="{0F114BEE-C543-0871-99D7-153138EA7CF3}"/>
+              </a:ext>
+            </a:extLst>
+          </p:cNvPr>
+          <p:cNvSpPr/>
+          <p:nvPr/>
+        </p:nvSpPr>
+        <p:spPr>
+          <a:xfrm>
+            <a:off x="2763340" y="5182961"/>
+            <a:ext cx="1234304" cy="355420"/>
+          </a:xfrm>
+          <a:prstGeom prst="ellipse">
+            <a:avLst/>
+          </a:prstGeom>
+          <a:noFill/>
+          <a:ln w="47625">
+            <a:solidFill>
+              <a:schemeClr val="accent2"/>
+            </a:solidFill>
+          </a:ln>
+        </p:spPr>
+        <p:style>
+          <a:lnRef idx="2">
+            <a:schemeClr val="accent1">
+              <a:shade val="15000"/>
+            </a:schemeClr>
+          </a:lnRef>
+          <a:fillRef idx="1">
+            <a:schemeClr val="accent1"/>
+          </a:fillRef>
+          <a:effectRef idx="0">
+            <a:schemeClr val="accent1"/>
+          </a:effectRef>
+          <a:fontRef idx="minor">
+            <a:schemeClr val="lt1"/>
+          </a:fontRef>
+        </p:style>
+        <p:txBody>
+          <a:bodyPr rtlCol="0" anchor="ctr"/>
+          <a:lstStyle/>
+          <a:p>
+            <a:pPr algn="ctr"/>
+            <a:endParaRPr lang="en-CA"/>
+          </a:p>
+        </p:txBody>
+      </p:sp>
+    </p:spTree>
+    <p:extLst>
+      <p:ext uri="{BB962C8B-B14F-4D97-AF65-F5344CB8AC3E}">
+        <p14:creationId xmlns:p14="http://schemas.microsoft.com/office/powerpoint/2010/main" val="3387509795"/>
+      </p:ext>
+    </p:extLst>
+  </p:cSld>
+  <p:clrMapOvr>
+    <a:masterClrMapping/>
+  </p:clrMapOvr>
+</p:sld>
+</file>
+
+<file path=ppt/slides/slide7.xml><?xml version="1.0" encoding="utf-8"?>
+<p:sld xmlns:a="http://schemas.openxmlformats.org/drawingml/2006/main" xmlns:r="http://schemas.openxmlformats.org/officeDocument/2006/relationships" xmlns:p="http://schemas.openxmlformats.org/presentationml/2006/main">
+  <p:cSld>
+    <p:spTree>
+      <p:nvGrpSpPr>
+        <p:cNvPr id="1" name=""/>
+        <p:cNvGrpSpPr/>
+        <p:nvPr/>
+      </p:nvGrpSpPr>
+      <p:grpSpPr>
+        <a:xfrm>
+          <a:off x="0" y="0"/>
+          <a:ext cx="0" cy="0"/>
+          <a:chOff x="0" y="0"/>
+          <a:chExt cx="0" cy="0"/>
+        </a:xfrm>
+      </p:grpSpPr>
+      <p:pic>
+        <p:nvPicPr>
+          <p:cNvPr id="6" name="Picture 5">
+            <a:extLst>
+              <a:ext uri="{FF2B5EF4-FFF2-40B4-BE49-F238E27FC236}">
+                <a16:creationId xmlns:a16="http://schemas.microsoft.com/office/drawing/2014/main" id="{5625F715-6C3E-35E3-A1BC-6F8A15C53DA3}"/>
+              </a:ext>
+            </a:extLst>
+          </p:cNvPr>
+          <p:cNvPicPr>
+            <a:picLocks noChangeAspect="1"/>
+          </p:cNvPicPr>
+          <p:nvPr/>
+        </p:nvPicPr>
+        <p:blipFill>
+          <a:blip r:embed="rId2"/>
+          <a:stretch>
+            <a:fillRect/>
+          </a:stretch>
+        </p:blipFill>
+        <p:spPr>
+          <a:xfrm>
+            <a:off x="5789081" y="920734"/>
+            <a:ext cx="5020376" cy="4772691"/>
+          </a:xfrm>
+          <a:prstGeom prst="rect">
+            <a:avLst/>
+          </a:prstGeom>
+        </p:spPr>
+      </p:pic>
+      <p:sp>
+        <p:nvSpPr>
+          <p:cNvPr id="7" name="Oval 6">
+            <a:extLst>
+              <a:ext uri="{FF2B5EF4-FFF2-40B4-BE49-F238E27FC236}">
+                <a16:creationId xmlns:a16="http://schemas.microsoft.com/office/drawing/2014/main" id="{4B7EB589-335A-490B-5476-679818C0DBFC}"/>
+              </a:ext>
+            </a:extLst>
+          </p:cNvPr>
+          <p:cNvSpPr/>
+          <p:nvPr/>
+        </p:nvSpPr>
+        <p:spPr>
+          <a:xfrm flipV="1">
+            <a:off x="5634447" y="4763588"/>
+            <a:ext cx="4171404" cy="400592"/>
+          </a:xfrm>
+          <a:prstGeom prst="ellipse">
+            <a:avLst/>
+          </a:prstGeom>
+          <a:noFill/>
+          <a:ln w="47625">
+            <a:solidFill>
+              <a:schemeClr val="accent2"/>
+            </a:solidFill>
+          </a:ln>
+        </p:spPr>
+        <p:style>
+          <a:lnRef idx="2">
+            <a:schemeClr val="accent1">
+              <a:shade val="15000"/>
+            </a:schemeClr>
+          </a:lnRef>
+          <a:fillRef idx="1">
+            <a:schemeClr val="accent1"/>
+          </a:fillRef>
+          <a:effectRef idx="0">
+            <a:schemeClr val="accent1"/>
+          </a:effectRef>
+          <a:fontRef idx="minor">
+            <a:schemeClr val="lt1"/>
+          </a:fontRef>
+        </p:style>
+        <p:txBody>
+          <a:bodyPr rtlCol="0" anchor="ctr"/>
+          <a:lstStyle/>
+          <a:p>
+            <a:pPr algn="ctr"/>
+            <a:endParaRPr lang="en-CA"/>
+          </a:p>
+        </p:txBody>
+      </p:sp>
+      <p:sp>
+        <p:nvSpPr>
+          <p:cNvPr id="8" name="Oval 7">
+            <a:extLst>
+              <a:ext uri="{FF2B5EF4-FFF2-40B4-BE49-F238E27FC236}">
+                <a16:creationId xmlns:a16="http://schemas.microsoft.com/office/drawing/2014/main" id="{CF24484E-13C1-E99D-A078-1F826ADF432F}"/>
+              </a:ext>
+            </a:extLst>
+          </p:cNvPr>
+          <p:cNvSpPr/>
+          <p:nvPr/>
+        </p:nvSpPr>
+        <p:spPr>
+          <a:xfrm>
+            <a:off x="9647466" y="1339489"/>
+            <a:ext cx="1234304" cy="355420"/>
+          </a:xfrm>
+          <a:prstGeom prst="ellipse">
+            <a:avLst/>
+          </a:prstGeom>
+          <a:noFill/>
+          <a:ln w="47625">
+            <a:solidFill>
+              <a:schemeClr val="accent2"/>
+            </a:solidFill>
+          </a:ln>
+        </p:spPr>
+        <p:style>
+          <a:lnRef idx="2">
+            <a:schemeClr val="accent1">
+              <a:shade val="15000"/>
+            </a:schemeClr>
+          </a:lnRef>
+          <a:fillRef idx="1">
+            <a:schemeClr val="accent1"/>
+          </a:fillRef>
+          <a:effectRef idx="0">
+            <a:schemeClr val="accent1"/>
+          </a:effectRef>
+          <a:fontRef idx="minor">
+            <a:schemeClr val="lt1"/>
+          </a:fontRef>
+        </p:style>
+        <p:txBody>
+          <a:bodyPr rtlCol="0" anchor="ctr"/>
+          <a:lstStyle/>
+          <a:p>
+            <a:pPr algn="ctr"/>
+            <a:endParaRPr lang="en-CA"/>
+          </a:p>
+        </p:txBody>
+      </p:sp>
+    </p:spTree>
+    <p:extLst>
+      <p:ext uri="{BB962C8B-B14F-4D97-AF65-F5344CB8AC3E}">
+        <p14:creationId xmlns:p14="http://schemas.microsoft.com/office/powerpoint/2010/main" val="3707435728"/>
+      </p:ext>
+    </p:extLst>
+  </p:cSld>
+  <p:clrMapOvr>
+    <a:masterClrMapping/>
+  </p:clrMapOvr>
+</p:sld>
+</file>
+
+<file path=ppt/slides/slide8.xml><?xml version="1.0" encoding="utf-8"?>
+<p:sld xmlns:a="http://schemas.openxmlformats.org/drawingml/2006/main" xmlns:r="http://schemas.openxmlformats.org/officeDocument/2006/relationships" xmlns:p="http://schemas.openxmlformats.org/presentationml/2006/main">
+  <p:cSld>
+    <p:spTree>
+      <p:nvGrpSpPr>
+        <p:cNvPr id="1" name=""/>
+        <p:cNvGrpSpPr/>
+        <p:nvPr/>
+      </p:nvGrpSpPr>
+      <p:grpSpPr>
+        <a:xfrm>
+          <a:off x="0" y="0"/>
+          <a:ext cx="0" cy="0"/>
+          <a:chOff x="0" y="0"/>
+          <a:chExt cx="0" cy="0"/>
+        </a:xfrm>
+      </p:grpSpPr>
+      <p:pic>
+        <p:nvPicPr>
+          <p:cNvPr id="3" name="Picture 2">
+            <a:extLst>
+              <a:ext uri="{FF2B5EF4-FFF2-40B4-BE49-F238E27FC236}">
+                <a16:creationId xmlns:a16="http://schemas.microsoft.com/office/drawing/2014/main" id="{25135CD1-DF58-C4EE-6A76-08C7117E6988}"/>
+              </a:ext>
+            </a:extLst>
+          </p:cNvPr>
+          <p:cNvPicPr>
+            <a:picLocks noChangeAspect="1"/>
+          </p:cNvPicPr>
+          <p:nvPr/>
+        </p:nvPicPr>
+        <p:blipFill>
+          <a:blip r:embed="rId2">
+            <a:extLst>
+              <a:ext uri="{28A0092B-C50C-407E-A947-70E740481C1C}">
+                <a14:useLocalDpi xmlns:a14="http://schemas.microsoft.com/office/drawing/2010/main" val="0"/>
+              </a:ext>
+            </a:extLst>
+          </a:blip>
+          <a:srcRect b="61204"/>
+          <a:stretch/>
+        </p:blipFill>
+        <p:spPr>
+          <a:xfrm>
+            <a:off x="1432861" y="990260"/>
+            <a:ext cx="9326277" cy="1892278"/>
+          </a:xfrm>
+          <a:prstGeom prst="rect">
+            <a:avLst/>
+          </a:prstGeom>
+        </p:spPr>
+      </p:pic>
+      <p:pic>
+        <p:nvPicPr>
+          <p:cNvPr id="5" name="Picture 4">
+            <a:extLst>
+              <a:ext uri="{FF2B5EF4-FFF2-40B4-BE49-F238E27FC236}">
+                <a16:creationId xmlns:a16="http://schemas.microsoft.com/office/drawing/2014/main" id="{5BB643E3-9DC7-0731-B485-C9F25A7D790B}"/>
+              </a:ext>
+            </a:extLst>
+          </p:cNvPr>
+          <p:cNvPicPr>
+            <a:picLocks noChangeAspect="1"/>
+          </p:cNvPicPr>
+          <p:nvPr/>
+        </p:nvPicPr>
+        <p:blipFill>
+          <a:blip r:embed="rId3">
+            <a:extLst>
+              <a:ext uri="{28A0092B-C50C-407E-A947-70E740481C1C}">
+                <a14:useLocalDpi xmlns:a14="http://schemas.microsoft.com/office/drawing/2010/main" val="0"/>
+              </a:ext>
+            </a:extLst>
+          </a:blip>
+          <a:srcRect b="61204"/>
+          <a:stretch/>
+        </p:blipFill>
+        <p:spPr>
+          <a:xfrm>
+            <a:off x="1432860" y="3429000"/>
+            <a:ext cx="9326277" cy="1892278"/>
+          </a:xfrm>
+          <a:prstGeom prst="rect">
+            <a:avLst/>
+          </a:prstGeom>
+        </p:spPr>
+      </p:pic>
+    </p:spTree>
+    <p:extLst>
+      <p:ext uri="{BB962C8B-B14F-4D97-AF65-F5344CB8AC3E}">
+        <p14:creationId xmlns:p14="http://schemas.microsoft.com/office/powerpoint/2010/main" val="1115456660"/>
+      </p:ext>
+    </p:extLst>
+  </p:cSld>
+  <p:clrMapOvr>
+    <a:masterClrMapping/>
+  </p:clrMapOvr>
+</p:sld>
+</file>
+
 <file path=ppt/slides/slide9.xml><?xml version="1.0" encoding="utf-8"?>
 <p:sld xmlns:a="http://schemas.openxmlformats.org/drawingml/2006/main" xmlns:r="http://schemas.openxmlformats.org/officeDocument/2006/relationships" xmlns:p="http://schemas.openxmlformats.org/presentationml/2006/main">
   <p:cSld>
@@ -4786,92 +5632,10 @@
           <a:chExt cx="0" cy="0"/>
         </a:xfrm>
       </p:grpSpPr>
-      <p:sp>
-        <p:nvSpPr>
-          <p:cNvPr id="8" name="Oval 7">
-            <a:extLst>
-              <a:ext uri="{FF2B5EF4-FFF2-40B4-BE49-F238E27FC236}">
-                <a16:creationId xmlns:a16="http://schemas.microsoft.com/office/drawing/2014/main" id="{BD801201-31B2-1682-A270-5DDFC3C29CBD}"/>
-              </a:ext>
-            </a:extLst>
-          </p:cNvPr>
-          <p:cNvSpPr/>
-          <p:nvPr/>
-        </p:nvSpPr>
-        <p:spPr>
-          <a:xfrm>
-            <a:off x="7743825" y="4972050"/>
-            <a:ext cx="1943100" cy="400050"/>
-          </a:xfrm>
-          <a:prstGeom prst="ellipse">
-            <a:avLst/>
-          </a:prstGeom>
-          <a:noFill/>
-          <a:ln w="47625">
-            <a:solidFill>
-              <a:schemeClr val="accent2"/>
-            </a:solidFill>
-          </a:ln>
-        </p:spPr>
-        <p:style>
-          <a:lnRef idx="2">
-            <a:schemeClr val="accent1">
-              <a:shade val="15000"/>
-            </a:schemeClr>
-          </a:lnRef>
-          <a:fillRef idx="1">
-            <a:schemeClr val="accent1"/>
-          </a:fillRef>
-          <a:effectRef idx="0">
-            <a:schemeClr val="accent1"/>
-          </a:effectRef>
-          <a:fontRef idx="minor">
-            <a:schemeClr val="lt1"/>
-          </a:fontRef>
-        </p:style>
-        <p:txBody>
-          <a:bodyPr rtlCol="0" anchor="ctr"/>
-          <a:lstStyle/>
-          <a:p>
-            <a:pPr algn="ctr"/>
-            <a:endParaRPr lang="en-CA"/>
-          </a:p>
-        </p:txBody>
-      </p:sp>
-      <p:pic>
-        <p:nvPicPr>
-          <p:cNvPr id="7" name="Picture 6">
-            <a:extLst>
-              <a:ext uri="{FF2B5EF4-FFF2-40B4-BE49-F238E27FC236}">
-                <a16:creationId xmlns:a16="http://schemas.microsoft.com/office/drawing/2014/main" id="{E85A58A4-D2E4-8115-CB21-8C12D79C8009}"/>
-              </a:ext>
-            </a:extLst>
-          </p:cNvPr>
-          <p:cNvPicPr>
-            <a:picLocks noChangeAspect="1"/>
-          </p:cNvPicPr>
-          <p:nvPr/>
-        </p:nvPicPr>
-        <p:blipFill>
-          <a:blip r:embed="rId2"/>
-          <a:stretch>
-            <a:fillRect/>
-          </a:stretch>
-        </p:blipFill>
-        <p:spPr>
-          <a:xfrm>
-            <a:off x="880334" y="1276049"/>
-            <a:ext cx="10431331" cy="4305901"/>
-          </a:xfrm>
-          <a:prstGeom prst="rect">
-            <a:avLst/>
-          </a:prstGeom>
-        </p:spPr>
-      </p:pic>
     </p:spTree>
     <p:extLst>
       <p:ext uri="{BB962C8B-B14F-4D97-AF65-F5344CB8AC3E}">
-        <p14:creationId xmlns:p14="http://schemas.microsoft.com/office/powerpoint/2010/main" val="366108043"/>
+        <p14:creationId xmlns:p14="http://schemas.microsoft.com/office/powerpoint/2010/main" val="3976848610"/>
       </p:ext>
     </p:extLst>
   </p:cSld>

</xml_diff>